<commit_message>
finished slides for 1st show
</commit_message>
<xml_diff>
--- a/ppt/vxlan-flannel-cn.pptx
+++ b/ppt/vxlan-flannel-cn.pptx
@@ -4,8 +4,23 @@
   <p:sldMasterIdLst>
     <p:sldMasterId id="2147483648" r:id="rId1"/>
   </p:sldMasterIdLst>
+  <p:notesMasterIdLst>
+    <p:notesMasterId r:id="rId15"/>
+  </p:notesMasterIdLst>
   <p:sldIdLst>
     <p:sldId id="256" r:id="rId2"/>
+    <p:sldId id="258" r:id="rId3"/>
+    <p:sldId id="259" r:id="rId4"/>
+    <p:sldId id="257" r:id="rId5"/>
+    <p:sldId id="260" r:id="rId6"/>
+    <p:sldId id="261" r:id="rId7"/>
+    <p:sldId id="262" r:id="rId8"/>
+    <p:sldId id="263" r:id="rId9"/>
+    <p:sldId id="264" r:id="rId10"/>
+    <p:sldId id="265" r:id="rId11"/>
+    <p:sldId id="266" r:id="rId12"/>
+    <p:sldId id="267" r:id="rId13"/>
+    <p:sldId id="268" r:id="rId14"/>
   </p:sldIdLst>
   <p:sldSz cx="12192000" cy="6858000"/>
   <p:notesSz cx="6858000" cy="9144000"/>
@@ -104,7 +119,475 @@
       </a:defRPr>
     </a:lvl9pPr>
   </p:defaultTextStyle>
+  <p:extLst>
+    <p:ext uri="{521415D9-36F7-43E2-AB2F-B90AF26B5E84}">
+      <p14:sectionLst xmlns:p14="http://schemas.microsoft.com/office/powerpoint/2010/main">
+        <p14:section name="Overview" id="{BC11A72B-4A5A-6347-86B9-0588113D9DBA}">
+          <p14:sldIdLst>
+            <p14:sldId id="256"/>
+            <p14:sldId id="258"/>
+            <p14:sldId id="259"/>
+          </p14:sldIdLst>
+        </p14:section>
+        <p14:section name="VXLAN" id="{EEDEBCD3-5D51-F341-A31D-DC0F00DF02B0}">
+          <p14:sldIdLst>
+            <p14:sldId id="257"/>
+            <p14:sldId id="260"/>
+            <p14:sldId id="261"/>
+            <p14:sldId id="262"/>
+            <p14:sldId id="263"/>
+            <p14:sldId id="264"/>
+          </p14:sldIdLst>
+        </p14:section>
+        <p14:section name="Flannel" id="{1F5B31B4-1F04-D143-981E-FB42A2501D98}">
+          <p14:sldIdLst>
+            <p14:sldId id="265"/>
+            <p14:sldId id="266"/>
+            <p14:sldId id="267"/>
+            <p14:sldId id="268"/>
+          </p14:sldIdLst>
+        </p14:section>
+      </p14:sectionLst>
+    </p:ext>
+    <p:ext uri="{EFAFB233-063F-42B5-8137-9DF3F51BA10A}">
+      <p15:sldGuideLst xmlns:p15="http://schemas.microsoft.com/office/powerpoint/2012/main"/>
+    </p:ext>
+  </p:extLst>
 </p:presentation>
+</file>
+
+<file path=ppt/notesMasters/notesMaster1.xml><?xml version="1.0" encoding="utf-8"?>
+<p:notesMaster xmlns:a="http://schemas.openxmlformats.org/drawingml/2006/main" xmlns:r="http://schemas.openxmlformats.org/officeDocument/2006/relationships" xmlns:p="http://schemas.openxmlformats.org/presentationml/2006/main">
+  <p:cSld>
+    <p:bg>
+      <p:bgRef idx="1001">
+        <a:schemeClr val="bg1"/>
+      </p:bgRef>
+    </p:bg>
+    <p:spTree>
+      <p:nvGrpSpPr>
+        <p:cNvPr id="1" name=""/>
+        <p:cNvGrpSpPr/>
+        <p:nvPr/>
+      </p:nvGrpSpPr>
+      <p:grpSpPr>
+        <a:xfrm>
+          <a:off x="0" y="0"/>
+          <a:ext cx="0" cy="0"/>
+          <a:chOff x="0" y="0"/>
+          <a:chExt cx="0" cy="0"/>
+        </a:xfrm>
+      </p:grpSpPr>
+      <p:sp>
+        <p:nvSpPr>
+          <p:cNvPr id="2" name="Header Placeholder 1"/>
+          <p:cNvSpPr>
+            <a:spLocks noGrp="1"/>
+          </p:cNvSpPr>
+          <p:nvPr>
+            <p:ph type="hdr" sz="quarter"/>
+          </p:nvPr>
+        </p:nvSpPr>
+        <p:spPr>
+          <a:xfrm>
+            <a:off x="0" y="0"/>
+            <a:ext cx="2971800" cy="458788"/>
+          </a:xfrm>
+          <a:prstGeom prst="rect">
+            <a:avLst/>
+          </a:prstGeom>
+        </p:spPr>
+        <p:txBody>
+          <a:bodyPr vert="horz" lIns="91440" tIns="45720" rIns="91440" bIns="45720" rtlCol="0"/>
+          <a:lstStyle>
+            <a:lvl1pPr algn="l">
+              <a:defRPr sz="1200"/>
+            </a:lvl1pPr>
+          </a:lstStyle>
+          <a:p>
+            <a:endParaRPr lang="en-US"/>
+          </a:p>
+        </p:txBody>
+      </p:sp>
+      <p:sp>
+        <p:nvSpPr>
+          <p:cNvPr id="3" name="Date Placeholder 2"/>
+          <p:cNvSpPr>
+            <a:spLocks noGrp="1"/>
+          </p:cNvSpPr>
+          <p:nvPr>
+            <p:ph type="dt" idx="1"/>
+          </p:nvPr>
+        </p:nvSpPr>
+        <p:spPr>
+          <a:xfrm>
+            <a:off x="3884613" y="0"/>
+            <a:ext cx="2971800" cy="458788"/>
+          </a:xfrm>
+          <a:prstGeom prst="rect">
+            <a:avLst/>
+          </a:prstGeom>
+        </p:spPr>
+        <p:txBody>
+          <a:bodyPr vert="horz" lIns="91440" tIns="45720" rIns="91440" bIns="45720" rtlCol="0"/>
+          <a:lstStyle>
+            <a:lvl1pPr algn="r">
+              <a:defRPr sz="1200"/>
+            </a:lvl1pPr>
+          </a:lstStyle>
+          <a:p>
+            <a:fld id="{A8E76328-3933-8B49-93F8-A4FEBE090445}" type="datetimeFigureOut">
+              <a:rPr lang="en-US" smtClean="0"/>
+              <a:t>3/19/17</a:t>
+            </a:fld>
+            <a:endParaRPr lang="en-US"/>
+          </a:p>
+        </p:txBody>
+      </p:sp>
+      <p:sp>
+        <p:nvSpPr>
+          <p:cNvPr id="4" name="Slide Image Placeholder 3"/>
+          <p:cNvSpPr>
+            <a:spLocks noGrp="1" noRot="1" noChangeAspect="1"/>
+          </p:cNvSpPr>
+          <p:nvPr>
+            <p:ph type="sldImg" idx="2"/>
+          </p:nvPr>
+        </p:nvSpPr>
+        <p:spPr>
+          <a:xfrm>
+            <a:off x="685800" y="1143000"/>
+            <a:ext cx="5486400" cy="3086100"/>
+          </a:xfrm>
+          <a:prstGeom prst="rect">
+            <a:avLst/>
+          </a:prstGeom>
+          <a:noFill/>
+          <a:ln w="12700">
+            <a:solidFill>
+              <a:prstClr val="black"/>
+            </a:solidFill>
+          </a:ln>
+        </p:spPr>
+        <p:txBody>
+          <a:bodyPr vert="horz" lIns="91440" tIns="45720" rIns="91440" bIns="45720" rtlCol="0" anchor="ctr"/>
+          <a:lstStyle/>
+          <a:p>
+            <a:endParaRPr lang="en-US"/>
+          </a:p>
+        </p:txBody>
+      </p:sp>
+      <p:sp>
+        <p:nvSpPr>
+          <p:cNvPr id="5" name="Notes Placeholder 4"/>
+          <p:cNvSpPr>
+            <a:spLocks noGrp="1"/>
+          </p:cNvSpPr>
+          <p:nvPr>
+            <p:ph type="body" sz="quarter" idx="3"/>
+          </p:nvPr>
+        </p:nvSpPr>
+        <p:spPr>
+          <a:xfrm>
+            <a:off x="685800" y="4400550"/>
+            <a:ext cx="5486400" cy="3600450"/>
+          </a:xfrm>
+          <a:prstGeom prst="rect">
+            <a:avLst/>
+          </a:prstGeom>
+        </p:spPr>
+        <p:txBody>
+          <a:bodyPr vert="horz" lIns="91440" tIns="45720" rIns="91440" bIns="45720" rtlCol="0"/>
+          <a:lstStyle/>
+          <a:p>
+            <a:pPr lvl="0"/>
+            <a:r>
+              <a:rPr lang="en-US" smtClean="0"/>
+              <a:t>Click to edit Master text styles</a:t>
+            </a:r>
+          </a:p>
+          <a:p>
+            <a:pPr lvl="1"/>
+            <a:r>
+              <a:rPr lang="en-US" smtClean="0"/>
+              <a:t>Second level</a:t>
+            </a:r>
+          </a:p>
+          <a:p>
+            <a:pPr lvl="2"/>
+            <a:r>
+              <a:rPr lang="en-US" smtClean="0"/>
+              <a:t>Third level</a:t>
+            </a:r>
+          </a:p>
+          <a:p>
+            <a:pPr lvl="3"/>
+            <a:r>
+              <a:rPr lang="en-US" smtClean="0"/>
+              <a:t>Fourth level</a:t>
+            </a:r>
+          </a:p>
+          <a:p>
+            <a:pPr lvl="4"/>
+            <a:r>
+              <a:rPr lang="en-US" smtClean="0"/>
+              <a:t>Fifth level</a:t>
+            </a:r>
+            <a:endParaRPr lang="en-US"/>
+          </a:p>
+        </p:txBody>
+      </p:sp>
+      <p:sp>
+        <p:nvSpPr>
+          <p:cNvPr id="6" name="Footer Placeholder 5"/>
+          <p:cNvSpPr>
+            <a:spLocks noGrp="1"/>
+          </p:cNvSpPr>
+          <p:nvPr>
+            <p:ph type="ftr" sz="quarter" idx="4"/>
+          </p:nvPr>
+        </p:nvSpPr>
+        <p:spPr>
+          <a:xfrm>
+            <a:off x="0" y="8685213"/>
+            <a:ext cx="2971800" cy="458787"/>
+          </a:xfrm>
+          <a:prstGeom prst="rect">
+            <a:avLst/>
+          </a:prstGeom>
+        </p:spPr>
+        <p:txBody>
+          <a:bodyPr vert="horz" lIns="91440" tIns="45720" rIns="91440" bIns="45720" rtlCol="0" anchor="b"/>
+          <a:lstStyle>
+            <a:lvl1pPr algn="l">
+              <a:defRPr sz="1200"/>
+            </a:lvl1pPr>
+          </a:lstStyle>
+          <a:p>
+            <a:endParaRPr lang="en-US"/>
+          </a:p>
+        </p:txBody>
+      </p:sp>
+      <p:sp>
+        <p:nvSpPr>
+          <p:cNvPr id="7" name="Slide Number Placeholder 6"/>
+          <p:cNvSpPr>
+            <a:spLocks noGrp="1"/>
+          </p:cNvSpPr>
+          <p:nvPr>
+            <p:ph type="sldNum" sz="quarter" idx="5"/>
+          </p:nvPr>
+        </p:nvSpPr>
+        <p:spPr>
+          <a:xfrm>
+            <a:off x="3884613" y="8685213"/>
+            <a:ext cx="2971800" cy="458787"/>
+          </a:xfrm>
+          <a:prstGeom prst="rect">
+            <a:avLst/>
+          </a:prstGeom>
+        </p:spPr>
+        <p:txBody>
+          <a:bodyPr vert="horz" lIns="91440" tIns="45720" rIns="91440" bIns="45720" rtlCol="0" anchor="b"/>
+          <a:lstStyle>
+            <a:lvl1pPr algn="r">
+              <a:defRPr sz="1200"/>
+            </a:lvl1pPr>
+          </a:lstStyle>
+          <a:p>
+            <a:fld id="{4FE7C1B1-6DB0-0347-819A-28D041DFCD82}" type="slidenum">
+              <a:rPr lang="en-US" smtClean="0"/>
+              <a:t>‹#›</a:t>
+            </a:fld>
+            <a:endParaRPr lang="en-US"/>
+          </a:p>
+        </p:txBody>
+      </p:sp>
+    </p:spTree>
+    <p:extLst>
+      <p:ext uri="{BB962C8B-B14F-4D97-AF65-F5344CB8AC3E}">
+        <p14:creationId xmlns:p14="http://schemas.microsoft.com/office/powerpoint/2010/main" val="1625552288"/>
+      </p:ext>
+    </p:extLst>
+  </p:cSld>
+  <p:clrMap bg1="lt1" tx1="dk1" bg2="lt2" tx2="dk2" accent1="accent1" accent2="accent2" accent3="accent3" accent4="accent4" accent5="accent5" accent6="accent6" hlink="hlink" folHlink="folHlink"/>
+  <p:notesStyle>
+    <a:lvl1pPr marL="0" algn="l" defTabSz="914400" rtl="0" eaLnBrk="1" latinLnBrk="0" hangingPunct="1">
+      <a:defRPr sz="1200" kern="1200">
+        <a:solidFill>
+          <a:schemeClr val="tx1"/>
+        </a:solidFill>
+        <a:latin typeface="+mn-lt"/>
+        <a:ea typeface="+mn-ea"/>
+        <a:cs typeface="+mn-cs"/>
+      </a:defRPr>
+    </a:lvl1pPr>
+    <a:lvl2pPr marL="457200" algn="l" defTabSz="914400" rtl="0" eaLnBrk="1" latinLnBrk="0" hangingPunct="1">
+      <a:defRPr sz="1200" kern="1200">
+        <a:solidFill>
+          <a:schemeClr val="tx1"/>
+        </a:solidFill>
+        <a:latin typeface="+mn-lt"/>
+        <a:ea typeface="+mn-ea"/>
+        <a:cs typeface="+mn-cs"/>
+      </a:defRPr>
+    </a:lvl2pPr>
+    <a:lvl3pPr marL="914400" algn="l" defTabSz="914400" rtl="0" eaLnBrk="1" latinLnBrk="0" hangingPunct="1">
+      <a:defRPr sz="1200" kern="1200">
+        <a:solidFill>
+          <a:schemeClr val="tx1"/>
+        </a:solidFill>
+        <a:latin typeface="+mn-lt"/>
+        <a:ea typeface="+mn-ea"/>
+        <a:cs typeface="+mn-cs"/>
+      </a:defRPr>
+    </a:lvl3pPr>
+    <a:lvl4pPr marL="1371600" algn="l" defTabSz="914400" rtl="0" eaLnBrk="1" latinLnBrk="0" hangingPunct="1">
+      <a:defRPr sz="1200" kern="1200">
+        <a:solidFill>
+          <a:schemeClr val="tx1"/>
+        </a:solidFill>
+        <a:latin typeface="+mn-lt"/>
+        <a:ea typeface="+mn-ea"/>
+        <a:cs typeface="+mn-cs"/>
+      </a:defRPr>
+    </a:lvl4pPr>
+    <a:lvl5pPr marL="1828800" algn="l" defTabSz="914400" rtl="0" eaLnBrk="1" latinLnBrk="0" hangingPunct="1">
+      <a:defRPr sz="1200" kern="1200">
+        <a:solidFill>
+          <a:schemeClr val="tx1"/>
+        </a:solidFill>
+        <a:latin typeface="+mn-lt"/>
+        <a:ea typeface="+mn-ea"/>
+        <a:cs typeface="+mn-cs"/>
+      </a:defRPr>
+    </a:lvl5pPr>
+    <a:lvl6pPr marL="2286000" algn="l" defTabSz="914400" rtl="0" eaLnBrk="1" latinLnBrk="0" hangingPunct="1">
+      <a:defRPr sz="1200" kern="1200">
+        <a:solidFill>
+          <a:schemeClr val="tx1"/>
+        </a:solidFill>
+        <a:latin typeface="+mn-lt"/>
+        <a:ea typeface="+mn-ea"/>
+        <a:cs typeface="+mn-cs"/>
+      </a:defRPr>
+    </a:lvl6pPr>
+    <a:lvl7pPr marL="2743200" algn="l" defTabSz="914400" rtl="0" eaLnBrk="1" latinLnBrk="0" hangingPunct="1">
+      <a:defRPr sz="1200" kern="1200">
+        <a:solidFill>
+          <a:schemeClr val="tx1"/>
+        </a:solidFill>
+        <a:latin typeface="+mn-lt"/>
+        <a:ea typeface="+mn-ea"/>
+        <a:cs typeface="+mn-cs"/>
+      </a:defRPr>
+    </a:lvl7pPr>
+    <a:lvl8pPr marL="3200400" algn="l" defTabSz="914400" rtl="0" eaLnBrk="1" latinLnBrk="0" hangingPunct="1">
+      <a:defRPr sz="1200" kern="1200">
+        <a:solidFill>
+          <a:schemeClr val="tx1"/>
+        </a:solidFill>
+        <a:latin typeface="+mn-lt"/>
+        <a:ea typeface="+mn-ea"/>
+        <a:cs typeface="+mn-cs"/>
+      </a:defRPr>
+    </a:lvl8pPr>
+    <a:lvl9pPr marL="3657600" algn="l" defTabSz="914400" rtl="0" eaLnBrk="1" latinLnBrk="0" hangingPunct="1">
+      <a:defRPr sz="1200" kern="1200">
+        <a:solidFill>
+          <a:schemeClr val="tx1"/>
+        </a:solidFill>
+        <a:latin typeface="+mn-lt"/>
+        <a:ea typeface="+mn-ea"/>
+        <a:cs typeface="+mn-cs"/>
+      </a:defRPr>
+    </a:lvl9pPr>
+  </p:notesStyle>
+</p:notesMaster>
+</file>
+
+<file path=ppt/notesSlides/notesSlide1.xml><?xml version="1.0" encoding="utf-8"?>
+<p:notes xmlns:a="http://schemas.openxmlformats.org/drawingml/2006/main" xmlns:r="http://schemas.openxmlformats.org/officeDocument/2006/relationships" xmlns:p="http://schemas.openxmlformats.org/presentationml/2006/main">
+  <p:cSld>
+    <p:spTree>
+      <p:nvGrpSpPr>
+        <p:cNvPr id="1" name=""/>
+        <p:cNvGrpSpPr/>
+        <p:nvPr/>
+      </p:nvGrpSpPr>
+      <p:grpSpPr>
+        <a:xfrm>
+          <a:off x="0" y="0"/>
+          <a:ext cx="0" cy="0"/>
+          <a:chOff x="0" y="0"/>
+          <a:chExt cx="0" cy="0"/>
+        </a:xfrm>
+      </p:grpSpPr>
+      <p:sp>
+        <p:nvSpPr>
+          <p:cNvPr id="2" name="Slide Image Placeholder 1"/>
+          <p:cNvSpPr>
+            <a:spLocks noGrp="1" noRot="1" noChangeAspect="1"/>
+          </p:cNvSpPr>
+          <p:nvPr>
+            <p:ph type="sldImg"/>
+          </p:nvPr>
+        </p:nvSpPr>
+        <p:spPr/>
+      </p:sp>
+      <p:sp>
+        <p:nvSpPr>
+          <p:cNvPr id="3" name="Notes Placeholder 2"/>
+          <p:cNvSpPr>
+            <a:spLocks noGrp="1"/>
+          </p:cNvSpPr>
+          <p:nvPr>
+            <p:ph type="body" idx="1"/>
+          </p:nvPr>
+        </p:nvSpPr>
+        <p:spPr/>
+        <p:txBody>
+          <a:bodyPr/>
+          <a:lstStyle/>
+          <a:p>
+            <a:endParaRPr lang="en-US" dirty="0"/>
+          </a:p>
+        </p:txBody>
+      </p:sp>
+      <p:sp>
+        <p:nvSpPr>
+          <p:cNvPr id="4" name="Slide Number Placeholder 3"/>
+          <p:cNvSpPr>
+            <a:spLocks noGrp="1"/>
+          </p:cNvSpPr>
+          <p:nvPr>
+            <p:ph type="sldNum" sz="quarter" idx="10"/>
+          </p:nvPr>
+        </p:nvSpPr>
+        <p:spPr/>
+        <p:txBody>
+          <a:bodyPr/>
+          <a:lstStyle/>
+          <a:p>
+            <a:fld id="{4FE7C1B1-6DB0-0347-819A-28D041DFCD82}" type="slidenum">
+              <a:rPr lang="en-US" smtClean="0"/>
+              <a:t>10</a:t>
+            </a:fld>
+            <a:endParaRPr lang="en-US"/>
+          </a:p>
+        </p:txBody>
+      </p:sp>
+    </p:spTree>
+    <p:extLst>
+      <p:ext uri="{BB962C8B-B14F-4D97-AF65-F5344CB8AC3E}">
+        <p14:creationId xmlns:p14="http://schemas.microsoft.com/office/powerpoint/2010/main" val="370347282"/>
+      </p:ext>
+    </p:extLst>
+  </p:cSld>
+  <p:clrMapOvr>
+    <a:masterClrMapping/>
+  </p:clrMapOvr>
+</p:notes>
 </file>
 
 <file path=ppt/slideLayouts/slideLayout1.xml><?xml version="1.0" encoding="utf-8"?>
@@ -278,7 +761,7 @@
           <a:p>
             <a:fld id="{48A87A34-81AB-432B-8DAE-1953F412C126}" type="datetimeFigureOut">
               <a:rPr lang="en-US" dirty="0"/>
-              <a:t>3/16/17</a:t>
+              <a:t>3/19/17</a:t>
             </a:fld>
             <a:endParaRPr lang="en-US" dirty="0"/>
           </a:p>
@@ -585,7 +1068,7 @@
           <a:p>
             <a:fld id="{48A87A34-81AB-432B-8DAE-1953F412C126}" type="datetimeFigureOut">
               <a:rPr lang="en-US" dirty="0"/>
-              <a:t>3/16/17</a:t>
+              <a:t>3/19/17</a:t>
             </a:fld>
             <a:endParaRPr lang="en-US" dirty="0"/>
           </a:p>
@@ -802,7 +1285,7 @@
           <a:p>
             <a:fld id="{48A87A34-81AB-432B-8DAE-1953F412C126}" type="datetimeFigureOut">
               <a:rPr lang="en-US" dirty="0"/>
-              <a:t>3/16/17</a:t>
+              <a:t>3/19/17</a:t>
             </a:fld>
             <a:endParaRPr lang="en-US" dirty="0"/>
           </a:p>
@@ -1088,7 +1571,7 @@
           <a:p>
             <a:fld id="{48A87A34-81AB-432B-8DAE-1953F412C126}" type="datetimeFigureOut">
               <a:rPr lang="en-US" dirty="0"/>
-              <a:t>3/16/17</a:t>
+              <a:t>3/19/17</a:t>
             </a:fld>
             <a:endParaRPr lang="en-US" dirty="0"/>
           </a:p>
@@ -1537,7 +2020,7 @@
           <a:p>
             <a:fld id="{48A87A34-81AB-432B-8DAE-1953F412C126}" type="datetimeFigureOut">
               <a:rPr lang="en-US" dirty="0"/>
-              <a:t>3/16/17</a:t>
+              <a:t>3/19/17</a:t>
             </a:fld>
             <a:endParaRPr lang="en-US" dirty="0"/>
           </a:p>
@@ -2108,7 +2591,7 @@
           <a:p>
             <a:fld id="{48A87A34-81AB-432B-8DAE-1953F412C126}" type="datetimeFigureOut">
               <a:rPr lang="en-US" dirty="0"/>
-              <a:t>3/16/17</a:t>
+              <a:t>3/19/17</a:t>
             </a:fld>
             <a:endParaRPr lang="en-US" dirty="0"/>
           </a:p>
@@ -2955,7 +3438,7 @@
           <a:p>
             <a:fld id="{48A87A34-81AB-432B-8DAE-1953F412C126}" type="datetimeFigureOut">
               <a:rPr lang="en-US" dirty="0"/>
-              <a:t>3/16/17</a:t>
+              <a:t>3/19/17</a:t>
             </a:fld>
             <a:endParaRPr lang="en-US" dirty="0"/>
           </a:p>
@@ -3155,7 +3638,7 @@
           <a:p>
             <a:fld id="{48A87A34-81AB-432B-8DAE-1953F412C126}" type="datetimeFigureOut">
               <a:rPr lang="en-US" dirty="0"/>
-              <a:t>3/16/17</a:t>
+              <a:t>3/19/17</a:t>
             </a:fld>
             <a:endParaRPr lang="en-US" dirty="0"/>
           </a:p>
@@ -3364,7 +3847,7 @@
           <a:p>
             <a:fld id="{48A87A34-81AB-432B-8DAE-1953F412C126}" type="datetimeFigureOut">
               <a:rPr lang="en-US" dirty="0"/>
-              <a:t>3/16/17</a:t>
+              <a:t>3/19/17</a:t>
             </a:fld>
             <a:endParaRPr lang="en-US" dirty="0"/>
           </a:p>
@@ -3564,7 +4047,7 @@
           <a:p>
             <a:fld id="{48A87A34-81AB-432B-8DAE-1953F412C126}" type="datetimeFigureOut">
               <a:rPr lang="en-US" dirty="0"/>
-              <a:t>3/16/17</a:t>
+              <a:t>3/19/17</a:t>
             </a:fld>
             <a:endParaRPr lang="en-US" dirty="0"/>
           </a:p>
@@ -3839,7 +4322,7 @@
           <a:p>
             <a:fld id="{48A87A34-81AB-432B-8DAE-1953F412C126}" type="datetimeFigureOut">
               <a:rPr lang="en-US" dirty="0"/>
-              <a:t>3/16/17</a:t>
+              <a:t>3/19/17</a:t>
             </a:fld>
             <a:endParaRPr lang="en-US" dirty="0"/>
           </a:p>
@@ -4101,7 +4584,7 @@
           <a:p>
             <a:fld id="{48A87A34-81AB-432B-8DAE-1953F412C126}" type="datetimeFigureOut">
               <a:rPr lang="en-US" dirty="0"/>
-              <a:t>3/16/17</a:t>
+              <a:t>3/19/17</a:t>
             </a:fld>
             <a:endParaRPr lang="en-US" dirty="0"/>
           </a:p>
@@ -4511,7 +4994,7 @@
           <a:p>
             <a:fld id="{48A87A34-81AB-432B-8DAE-1953F412C126}" type="datetimeFigureOut">
               <a:rPr lang="en-US" dirty="0"/>
-              <a:t>3/16/17</a:t>
+              <a:t>3/19/17</a:t>
             </a:fld>
             <a:endParaRPr lang="en-US" dirty="0"/>
           </a:p>
@@ -4654,7 +5137,7 @@
           <a:p>
             <a:fld id="{48A87A34-81AB-432B-8DAE-1953F412C126}" type="datetimeFigureOut">
               <a:rPr lang="en-US" dirty="0"/>
-              <a:t>3/16/17</a:t>
+              <a:t>3/19/17</a:t>
             </a:fld>
             <a:endParaRPr lang="en-US" dirty="0"/>
           </a:p>
@@ -4774,7 +5257,7 @@
           <a:p>
             <a:fld id="{48A87A34-81AB-432B-8DAE-1953F412C126}" type="datetimeFigureOut">
               <a:rPr lang="en-US" dirty="0"/>
-              <a:t>3/16/17</a:t>
+              <a:t>3/19/17</a:t>
             </a:fld>
             <a:endParaRPr lang="en-US" dirty="0"/>
           </a:p>
@@ -5048,7 +5531,7 @@
           <a:p>
             <a:fld id="{48A87A34-81AB-432B-8DAE-1953F412C126}" type="datetimeFigureOut">
               <a:rPr lang="en-US" dirty="0"/>
-              <a:t>3/16/17</a:t>
+              <a:t>3/19/17</a:t>
             </a:fld>
             <a:endParaRPr lang="en-US" dirty="0"/>
           </a:p>
@@ -5355,7 +5838,7 @@
           <a:p>
             <a:fld id="{48A87A34-81AB-432B-8DAE-1953F412C126}" type="datetimeFigureOut">
               <a:rPr lang="en-US" dirty="0"/>
-              <a:t>3/16/17</a:t>
+              <a:t>3/19/17</a:t>
             </a:fld>
             <a:endParaRPr lang="en-US" dirty="0"/>
           </a:p>
@@ -5604,7 +6087,7 @@
             <a:fld id="{48A87A34-81AB-432B-8DAE-1953F412C126}" type="datetimeFigureOut">
               <a:rPr lang="en-US" dirty="0"/>
               <a:pPr/>
-              <a:t>3/16/17</a:t>
+              <a:t>3/19/17</a:t>
             </a:fld>
             <a:endParaRPr lang="en-US" dirty="0"/>
           </a:p>
@@ -6060,12 +6543,8 @@
           <a:lstStyle/>
           <a:p>
             <a:r>
-              <a:rPr lang="en-US" dirty="0" err="1" smtClean="0"/>
-              <a:t>Vxlan</a:t>
-            </a:r>
-            <a:r>
               <a:rPr lang="en-US" dirty="0" smtClean="0"/>
-              <a:t> &amp; Flannel</a:t>
+              <a:t>VXLAN in Flannel</a:t>
             </a:r>
             <a:endParaRPr lang="en-US" dirty="0"/>
           </a:p>
@@ -6087,16 +6566,38 @@
           <a:lstStyle/>
           <a:p>
             <a:r>
-              <a:rPr lang="zh-CN" altLang="en-US" smtClean="0"/>
+              <a:rPr lang="zh-CN" altLang="en-US" dirty="0" smtClean="0"/>
               <a:t>杨谕黔</a:t>
             </a:r>
             <a:r>
-              <a:rPr lang="en-US" altLang="zh-CN"/>
+              <a:rPr lang="en-US" altLang="zh-CN" cap="none" dirty="0" smtClean="0"/>
               <a:t>(</a:t>
             </a:r>
             <a:r>
-              <a:rPr lang="en-US" altLang="zh-CN" smtClean="0"/>
+              <a:rPr lang="en-US" altLang="zh-CN" cap="none" dirty="0" err="1" smtClean="0"/>
+              <a:t>boscoyoung@gmail.com</a:t>
+            </a:r>
+            <a:r>
+              <a:rPr lang="en-US" altLang="zh-CN" cap="none" dirty="0" smtClean="0"/>
               <a:t>)</a:t>
+            </a:r>
+          </a:p>
+          <a:p>
+            <a:r>
+              <a:rPr lang="en-US" cap="none" dirty="0" smtClean="0"/>
+              <a:t>https://</a:t>
+            </a:r>
+            <a:r>
+              <a:rPr lang="en-US" cap="none" dirty="0" err="1" smtClean="0"/>
+              <a:t>github.com</a:t>
+            </a:r>
+            <a:r>
+              <a:rPr lang="en-US" cap="none" dirty="0" smtClean="0"/>
+              <a:t>/</a:t>
+            </a:r>
+            <a:r>
+              <a:rPr lang="en-US" cap="none" dirty="0" err="1" smtClean="0"/>
+              <a:t>yangyuqian</a:t>
             </a:r>
             <a:endParaRPr lang="en-US" dirty="0"/>
           </a:p>
@@ -6106,6 +6607,1400 @@
     <p:extLst>
       <p:ext uri="{BB962C8B-B14F-4D97-AF65-F5344CB8AC3E}">
         <p14:creationId xmlns:p14="http://schemas.microsoft.com/office/powerpoint/2010/main" val="1627193877"/>
+      </p:ext>
+    </p:extLst>
+  </p:cSld>
+  <p:clrMapOvr>
+    <a:masterClrMapping/>
+  </p:clrMapOvr>
+  <p:timing>
+    <p:tnLst>
+      <p:par>
+        <p:cTn id="1" dur="indefinite" restart="never" nodeType="tmRoot"/>
+      </p:par>
+    </p:tnLst>
+  </p:timing>
+</p:sld>
+</file>
+
+<file path=ppt/slides/slide10.xml><?xml version="1.0" encoding="utf-8"?>
+<p:sld xmlns:a="http://schemas.openxmlformats.org/drawingml/2006/main" xmlns:r="http://schemas.openxmlformats.org/officeDocument/2006/relationships" xmlns:p="http://schemas.openxmlformats.org/presentationml/2006/main">
+  <p:cSld>
+    <p:spTree>
+      <p:nvGrpSpPr>
+        <p:cNvPr id="1" name=""/>
+        <p:cNvGrpSpPr/>
+        <p:nvPr/>
+      </p:nvGrpSpPr>
+      <p:grpSpPr>
+        <a:xfrm>
+          <a:off x="0" y="0"/>
+          <a:ext cx="0" cy="0"/>
+          <a:chOff x="0" y="0"/>
+          <a:chExt cx="0" cy="0"/>
+        </a:xfrm>
+      </p:grpSpPr>
+      <p:sp>
+        <p:nvSpPr>
+          <p:cNvPr id="2" name="Title 1"/>
+          <p:cNvSpPr>
+            <a:spLocks noGrp="1"/>
+          </p:cNvSpPr>
+          <p:nvPr>
+            <p:ph type="title"/>
+          </p:nvPr>
+        </p:nvSpPr>
+        <p:spPr/>
+        <p:txBody>
+          <a:bodyPr/>
+          <a:lstStyle/>
+          <a:p>
+            <a:r>
+              <a:rPr lang="en-US" dirty="0" smtClean="0"/>
+              <a:t>Flannel</a:t>
+            </a:r>
+            <a:endParaRPr lang="en-US" dirty="0"/>
+          </a:p>
+        </p:txBody>
+      </p:sp>
+      <p:sp>
+        <p:nvSpPr>
+          <p:cNvPr id="3" name="Content Placeholder 2"/>
+          <p:cNvSpPr>
+            <a:spLocks noGrp="1"/>
+          </p:cNvSpPr>
+          <p:nvPr>
+            <p:ph sz="quarter" idx="13"/>
+          </p:nvPr>
+        </p:nvSpPr>
+        <p:spPr/>
+        <p:txBody>
+          <a:bodyPr/>
+          <a:lstStyle/>
+          <a:p>
+            <a:r>
+              <a:rPr lang="en-US" cap="none" dirty="0" smtClean="0"/>
+              <a:t>Flannel is a virtual network that gives a subnet to each host for use with container runtimes.</a:t>
+            </a:r>
+          </a:p>
+          <a:p>
+            <a:r>
+              <a:rPr lang="en-US" cap="none" dirty="0" smtClean="0"/>
+              <a:t>Platforms like </a:t>
+            </a:r>
+            <a:r>
+              <a:rPr lang="en-US" cap="none" dirty="0"/>
+              <a:t>K</a:t>
+            </a:r>
+            <a:r>
+              <a:rPr lang="en-US" cap="none" dirty="0" smtClean="0"/>
+              <a:t>ubernetes assume that each container (pod) has a unique, routable </a:t>
+            </a:r>
+            <a:r>
+              <a:rPr lang="en-US" cap="none" dirty="0" err="1" smtClean="0"/>
+              <a:t>ip</a:t>
+            </a:r>
+            <a:r>
+              <a:rPr lang="en-US" cap="none" dirty="0" smtClean="0"/>
+              <a:t> inside the cluster. The advantage of this model is that it reduces the complexity of doing port mapping.</a:t>
+            </a:r>
+            <a:endParaRPr lang="en-US" cap="none" dirty="0"/>
+          </a:p>
+        </p:txBody>
+      </p:sp>
+    </p:spTree>
+    <p:extLst>
+      <p:ext uri="{BB962C8B-B14F-4D97-AF65-F5344CB8AC3E}">
+        <p14:creationId xmlns:p14="http://schemas.microsoft.com/office/powerpoint/2010/main" val="1800318079"/>
+      </p:ext>
+    </p:extLst>
+  </p:cSld>
+  <p:clrMapOvr>
+    <a:masterClrMapping/>
+  </p:clrMapOvr>
+  <p:timing>
+    <p:tnLst>
+      <p:par>
+        <p:cTn id="1" dur="indefinite" restart="never" nodeType="tmRoot"/>
+      </p:par>
+    </p:tnLst>
+  </p:timing>
+</p:sld>
+</file>
+
+<file path=ppt/slides/slide11.xml><?xml version="1.0" encoding="utf-8"?>
+<p:sld xmlns:a="http://schemas.openxmlformats.org/drawingml/2006/main" xmlns:r="http://schemas.openxmlformats.org/officeDocument/2006/relationships" xmlns:p="http://schemas.openxmlformats.org/presentationml/2006/main">
+  <p:cSld>
+    <p:spTree>
+      <p:nvGrpSpPr>
+        <p:cNvPr id="1" name=""/>
+        <p:cNvGrpSpPr/>
+        <p:nvPr/>
+      </p:nvGrpSpPr>
+      <p:grpSpPr>
+        <a:xfrm>
+          <a:off x="0" y="0"/>
+          <a:ext cx="0" cy="0"/>
+          <a:chOff x="0" y="0"/>
+          <a:chExt cx="0" cy="0"/>
+        </a:xfrm>
+      </p:grpSpPr>
+      <p:sp>
+        <p:nvSpPr>
+          <p:cNvPr id="2" name="Title 1"/>
+          <p:cNvSpPr>
+            <a:spLocks noGrp="1"/>
+          </p:cNvSpPr>
+          <p:nvPr>
+            <p:ph type="title"/>
+          </p:nvPr>
+        </p:nvSpPr>
+        <p:spPr/>
+        <p:txBody>
+          <a:bodyPr/>
+          <a:lstStyle/>
+          <a:p>
+            <a:r>
+              <a:rPr lang="en-US" dirty="0" smtClean="0"/>
+              <a:t>VXLAN backend</a:t>
+            </a:r>
+            <a:endParaRPr lang="en-US" dirty="0"/>
+          </a:p>
+        </p:txBody>
+      </p:sp>
+      <p:pic>
+        <p:nvPicPr>
+          <p:cNvPr id="8" name="Content Placeholder 7"/>
+          <p:cNvPicPr>
+            <a:picLocks noGrp="1" noChangeAspect="1"/>
+          </p:cNvPicPr>
+          <p:nvPr>
+            <p:ph sz="quarter" idx="13"/>
+          </p:nvPr>
+        </p:nvPicPr>
+        <p:blipFill>
+          <a:blip r:embed="rId2">
+            <a:extLst>
+              <a:ext uri="{28A0092B-C50C-407E-A947-70E740481C1C}">
+                <a14:useLocalDpi xmlns:a14="http://schemas.microsoft.com/office/drawing/2010/main" val="0"/>
+              </a:ext>
+            </a:extLst>
+          </a:blip>
+          <a:stretch>
+            <a:fillRect/>
+          </a:stretch>
+        </p:blipFill>
+        <p:spPr>
+          <a:xfrm>
+            <a:off x="1741728" y="1782173"/>
+            <a:ext cx="7870105" cy="4883828"/>
+          </a:xfrm>
+        </p:spPr>
+      </p:pic>
+    </p:spTree>
+    <p:extLst>
+      <p:ext uri="{BB962C8B-B14F-4D97-AF65-F5344CB8AC3E}">
+        <p14:creationId xmlns:p14="http://schemas.microsoft.com/office/powerpoint/2010/main" val="439217011"/>
+      </p:ext>
+    </p:extLst>
+  </p:cSld>
+  <p:clrMapOvr>
+    <a:masterClrMapping/>
+  </p:clrMapOvr>
+  <p:timing>
+    <p:tnLst>
+      <p:par>
+        <p:cTn id="1" dur="indefinite" restart="never" nodeType="tmRoot"/>
+      </p:par>
+    </p:tnLst>
+  </p:timing>
+</p:sld>
+</file>
+
+<file path=ppt/slides/slide12.xml><?xml version="1.0" encoding="utf-8"?>
+<p:sld xmlns:a="http://schemas.openxmlformats.org/drawingml/2006/main" xmlns:r="http://schemas.openxmlformats.org/officeDocument/2006/relationships" xmlns:p="http://schemas.openxmlformats.org/presentationml/2006/main">
+  <p:cSld>
+    <p:spTree>
+      <p:nvGrpSpPr>
+        <p:cNvPr id="1" name=""/>
+        <p:cNvGrpSpPr/>
+        <p:nvPr/>
+      </p:nvGrpSpPr>
+      <p:grpSpPr>
+        <a:xfrm>
+          <a:off x="0" y="0"/>
+          <a:ext cx="0" cy="0"/>
+          <a:chOff x="0" y="0"/>
+          <a:chExt cx="0" cy="0"/>
+        </a:xfrm>
+      </p:grpSpPr>
+      <p:sp>
+        <p:nvSpPr>
+          <p:cNvPr id="2" name="Title 1"/>
+          <p:cNvSpPr>
+            <a:spLocks noGrp="1"/>
+          </p:cNvSpPr>
+          <p:nvPr>
+            <p:ph type="title"/>
+          </p:nvPr>
+        </p:nvSpPr>
+        <p:spPr/>
+        <p:txBody>
+          <a:bodyPr/>
+          <a:lstStyle/>
+          <a:p>
+            <a:r>
+              <a:rPr lang="en-US" dirty="0"/>
+              <a:t>VXLAN backend</a:t>
+            </a:r>
+          </a:p>
+        </p:txBody>
+      </p:sp>
+      <p:sp>
+        <p:nvSpPr>
+          <p:cNvPr id="3" name="Content Placeholder 2"/>
+          <p:cNvSpPr>
+            <a:spLocks noGrp="1"/>
+          </p:cNvSpPr>
+          <p:nvPr>
+            <p:ph sz="quarter" idx="13"/>
+          </p:nvPr>
+        </p:nvSpPr>
+        <p:spPr/>
+        <p:txBody>
+          <a:bodyPr/>
+          <a:lstStyle/>
+          <a:p>
+            <a:r>
+              <a:rPr lang="en-US" cap="none" dirty="0" smtClean="0"/>
+              <a:t>Flannel daemon listens on L3 </a:t>
+            </a:r>
+            <a:r>
+              <a:rPr lang="en-US" cap="none" dirty="0" err="1" smtClean="0"/>
+              <a:t>MISSes</a:t>
+            </a:r>
+            <a:r>
+              <a:rPr lang="en-US" cap="none" dirty="0" smtClean="0"/>
+              <a:t>, then update the ARP cache according to registered subnets</a:t>
+            </a:r>
+            <a:endParaRPr lang="en-US" cap="none" dirty="0"/>
+          </a:p>
+        </p:txBody>
+      </p:sp>
+    </p:spTree>
+    <p:extLst>
+      <p:ext uri="{BB962C8B-B14F-4D97-AF65-F5344CB8AC3E}">
+        <p14:creationId xmlns:p14="http://schemas.microsoft.com/office/powerpoint/2010/main" val="1685497518"/>
+      </p:ext>
+    </p:extLst>
+  </p:cSld>
+  <p:clrMapOvr>
+    <a:masterClrMapping/>
+  </p:clrMapOvr>
+</p:sld>
+</file>
+
+<file path=ppt/slides/slide13.xml><?xml version="1.0" encoding="utf-8"?>
+<p:sld xmlns:a="http://schemas.openxmlformats.org/drawingml/2006/main" xmlns:r="http://schemas.openxmlformats.org/officeDocument/2006/relationships" xmlns:p="http://schemas.openxmlformats.org/presentationml/2006/main">
+  <p:cSld>
+    <p:spTree>
+      <p:nvGrpSpPr>
+        <p:cNvPr id="1" name=""/>
+        <p:cNvGrpSpPr/>
+        <p:nvPr/>
+      </p:nvGrpSpPr>
+      <p:grpSpPr>
+        <a:xfrm>
+          <a:off x="0" y="0"/>
+          <a:ext cx="0" cy="0"/>
+          <a:chOff x="0" y="0"/>
+          <a:chExt cx="0" cy="0"/>
+        </a:xfrm>
+      </p:grpSpPr>
+      <p:sp>
+        <p:nvSpPr>
+          <p:cNvPr id="2" name="Title 1"/>
+          <p:cNvSpPr>
+            <a:spLocks noGrp="1"/>
+          </p:cNvSpPr>
+          <p:nvPr>
+            <p:ph type="title"/>
+          </p:nvPr>
+        </p:nvSpPr>
+        <p:spPr/>
+        <p:txBody>
+          <a:bodyPr/>
+          <a:lstStyle/>
+          <a:p>
+            <a:r>
+              <a:rPr lang="en-US" dirty="0" smtClean="0"/>
+              <a:t>Q&amp;A</a:t>
+            </a:r>
+            <a:endParaRPr lang="en-US" dirty="0"/>
+          </a:p>
+        </p:txBody>
+      </p:sp>
+      <p:sp>
+        <p:nvSpPr>
+          <p:cNvPr id="3" name="Text Placeholder 2"/>
+          <p:cNvSpPr>
+            <a:spLocks noGrp="1"/>
+          </p:cNvSpPr>
+          <p:nvPr>
+            <p:ph type="body" sz="half" idx="2"/>
+          </p:nvPr>
+        </p:nvSpPr>
+        <p:spPr/>
+        <p:txBody>
+          <a:bodyPr/>
+          <a:lstStyle/>
+          <a:p>
+            <a:r>
+              <a:rPr lang="en-US" smtClean="0"/>
+              <a:t>Thank You!</a:t>
+            </a:r>
+            <a:endParaRPr lang="en-US"/>
+          </a:p>
+        </p:txBody>
+      </p:sp>
+    </p:spTree>
+    <p:extLst>
+      <p:ext uri="{BB962C8B-B14F-4D97-AF65-F5344CB8AC3E}">
+        <p14:creationId xmlns:p14="http://schemas.microsoft.com/office/powerpoint/2010/main" val="1365167278"/>
+      </p:ext>
+    </p:extLst>
+  </p:cSld>
+  <p:clrMapOvr>
+    <a:masterClrMapping/>
+  </p:clrMapOvr>
+</p:sld>
+</file>
+
+<file path=ppt/slides/slide2.xml><?xml version="1.0" encoding="utf-8"?>
+<p:sld xmlns:a="http://schemas.openxmlformats.org/drawingml/2006/main" xmlns:r="http://schemas.openxmlformats.org/officeDocument/2006/relationships" xmlns:p="http://schemas.openxmlformats.org/presentationml/2006/main">
+  <p:cSld>
+    <p:spTree>
+      <p:nvGrpSpPr>
+        <p:cNvPr id="1" name=""/>
+        <p:cNvGrpSpPr/>
+        <p:nvPr/>
+      </p:nvGrpSpPr>
+      <p:grpSpPr>
+        <a:xfrm>
+          <a:off x="0" y="0"/>
+          <a:ext cx="0" cy="0"/>
+          <a:chOff x="0" y="0"/>
+          <a:chExt cx="0" cy="0"/>
+        </a:xfrm>
+      </p:grpSpPr>
+      <p:sp>
+        <p:nvSpPr>
+          <p:cNvPr id="2" name="Title 1"/>
+          <p:cNvSpPr>
+            <a:spLocks noGrp="1"/>
+          </p:cNvSpPr>
+          <p:nvPr>
+            <p:ph type="title"/>
+          </p:nvPr>
+        </p:nvSpPr>
+        <p:spPr/>
+        <p:txBody>
+          <a:bodyPr/>
+          <a:lstStyle/>
+          <a:p>
+            <a:r>
+              <a:rPr lang="en-US" dirty="0" smtClean="0"/>
+              <a:t>outline</a:t>
+            </a:r>
+            <a:endParaRPr lang="en-US" dirty="0"/>
+          </a:p>
+        </p:txBody>
+      </p:sp>
+      <p:sp>
+        <p:nvSpPr>
+          <p:cNvPr id="3" name="Content Placeholder 2"/>
+          <p:cNvSpPr>
+            <a:spLocks noGrp="1"/>
+          </p:cNvSpPr>
+          <p:nvPr>
+            <p:ph sz="quarter" idx="13"/>
+          </p:nvPr>
+        </p:nvSpPr>
+        <p:spPr/>
+        <p:txBody>
+          <a:bodyPr/>
+          <a:lstStyle/>
+          <a:p>
+            <a:r>
+              <a:rPr lang="en-US" dirty="0" smtClean="0"/>
+              <a:t>VXLAN</a:t>
+            </a:r>
+          </a:p>
+          <a:p>
+            <a:pPr lvl="1"/>
+            <a:r>
+              <a:rPr lang="en-US" cap="none" dirty="0" smtClean="0"/>
+              <a:t>Brief introduction to </a:t>
+            </a:r>
+            <a:r>
+              <a:rPr lang="en-US" cap="none" dirty="0" err="1" smtClean="0"/>
+              <a:t>vxlan</a:t>
+            </a:r>
+            <a:r>
+              <a:rPr lang="en-US" cap="none" dirty="0" smtClean="0"/>
+              <a:t> support in Linux Kernel</a:t>
+            </a:r>
+          </a:p>
+          <a:p>
+            <a:pPr lvl="1"/>
+            <a:r>
+              <a:rPr lang="en-US" cap="none" dirty="0" smtClean="0"/>
+              <a:t>Create an Overlay Network with native </a:t>
+            </a:r>
+            <a:r>
+              <a:rPr lang="en-US" cap="none" dirty="0" err="1" smtClean="0"/>
+              <a:t>vxlan</a:t>
+            </a:r>
+            <a:r>
+              <a:rPr lang="en-US" cap="none" dirty="0" smtClean="0"/>
+              <a:t> support in the Kernel</a:t>
+            </a:r>
+          </a:p>
+          <a:p>
+            <a:r>
+              <a:rPr lang="en-US" cap="none" dirty="0" err="1" smtClean="0"/>
+              <a:t>vxlan</a:t>
+            </a:r>
+            <a:r>
+              <a:rPr lang="en-US" cap="none" dirty="0" smtClean="0"/>
+              <a:t> backend in flannel</a:t>
+            </a:r>
+          </a:p>
+          <a:p>
+            <a:pPr lvl="1"/>
+            <a:r>
+              <a:rPr lang="en-US" cap="none" dirty="0" smtClean="0"/>
+              <a:t>Go through implementation of </a:t>
+            </a:r>
+            <a:r>
+              <a:rPr lang="en-US" cap="none" dirty="0" err="1" smtClean="0"/>
+              <a:t>vxlan</a:t>
+            </a:r>
+            <a:r>
+              <a:rPr lang="en-US" cap="none" dirty="0" smtClean="0"/>
+              <a:t> backend in Flannel</a:t>
+            </a:r>
+          </a:p>
+        </p:txBody>
+      </p:sp>
+    </p:spTree>
+    <p:extLst>
+      <p:ext uri="{BB962C8B-B14F-4D97-AF65-F5344CB8AC3E}">
+        <p14:creationId xmlns:p14="http://schemas.microsoft.com/office/powerpoint/2010/main" val="2006331888"/>
+      </p:ext>
+    </p:extLst>
+  </p:cSld>
+  <p:clrMapOvr>
+    <a:masterClrMapping/>
+  </p:clrMapOvr>
+  <p:timing>
+    <p:tnLst>
+      <p:par>
+        <p:cTn id="1" dur="indefinite" restart="never" nodeType="tmRoot"/>
+      </p:par>
+    </p:tnLst>
+  </p:timing>
+</p:sld>
+</file>
+
+<file path=ppt/slides/slide3.xml><?xml version="1.0" encoding="utf-8"?>
+<p:sld xmlns:a="http://schemas.openxmlformats.org/drawingml/2006/main" xmlns:r="http://schemas.openxmlformats.org/officeDocument/2006/relationships" xmlns:p="http://schemas.openxmlformats.org/presentationml/2006/main">
+  <p:cSld>
+    <p:spTree>
+      <p:nvGrpSpPr>
+        <p:cNvPr id="1" name=""/>
+        <p:cNvGrpSpPr/>
+        <p:nvPr/>
+      </p:nvGrpSpPr>
+      <p:grpSpPr>
+        <a:xfrm>
+          <a:off x="0" y="0"/>
+          <a:ext cx="0" cy="0"/>
+          <a:chOff x="0" y="0"/>
+          <a:chExt cx="0" cy="0"/>
+        </a:xfrm>
+      </p:grpSpPr>
+      <p:sp>
+        <p:nvSpPr>
+          <p:cNvPr id="2" name="Title 1"/>
+          <p:cNvSpPr>
+            <a:spLocks noGrp="1"/>
+          </p:cNvSpPr>
+          <p:nvPr>
+            <p:ph type="title"/>
+          </p:nvPr>
+        </p:nvSpPr>
+        <p:spPr/>
+        <p:txBody>
+          <a:bodyPr/>
+          <a:lstStyle/>
+          <a:p>
+            <a:r>
+              <a:rPr lang="en-US" cap="none" dirty="0" smtClean="0"/>
+              <a:t>Benefits</a:t>
+            </a:r>
+            <a:endParaRPr lang="en-US" cap="none" dirty="0"/>
+          </a:p>
+        </p:txBody>
+      </p:sp>
+      <p:sp>
+        <p:nvSpPr>
+          <p:cNvPr id="3" name="Content Placeholder 2"/>
+          <p:cNvSpPr>
+            <a:spLocks noGrp="1"/>
+          </p:cNvSpPr>
+          <p:nvPr>
+            <p:ph sz="quarter" idx="13"/>
+          </p:nvPr>
+        </p:nvSpPr>
+        <p:spPr/>
+        <p:txBody>
+          <a:bodyPr/>
+          <a:lstStyle/>
+          <a:p>
+            <a:pPr>
+              <a:lnSpc>
+                <a:spcPct val="100000"/>
+              </a:lnSpc>
+              <a:spcBef>
+                <a:spcPts val="0"/>
+              </a:spcBef>
+              <a:buClrTx/>
+            </a:pPr>
+            <a:r>
+              <a:rPr lang="en-US" cap="none" dirty="0" smtClean="0"/>
+              <a:t>Extend IP address ranges in </a:t>
+            </a:r>
+            <a:r>
+              <a:rPr lang="en-US" cap="none" dirty="0"/>
+              <a:t>a </a:t>
+            </a:r>
+            <a:r>
+              <a:rPr lang="en-US" cap="none" dirty="0" smtClean="0"/>
+              <a:t>multi-tenant platform by a 24bit VNI</a:t>
+            </a:r>
+          </a:p>
+          <a:p>
+            <a:pPr>
+              <a:lnSpc>
+                <a:spcPct val="100000"/>
+              </a:lnSpc>
+              <a:spcBef>
+                <a:spcPts val="0"/>
+              </a:spcBef>
+              <a:buClrTx/>
+            </a:pPr>
+            <a:r>
+              <a:rPr lang="en-US" cap="none" dirty="0"/>
+              <a:t>V</a:t>
+            </a:r>
+            <a:r>
+              <a:rPr lang="en-US" cap="none" dirty="0" smtClean="0"/>
+              <a:t>irtualized L2 communication upon existing L3 network(UDP)</a:t>
+            </a:r>
+          </a:p>
+        </p:txBody>
+      </p:sp>
+    </p:spTree>
+    <p:extLst>
+      <p:ext uri="{BB962C8B-B14F-4D97-AF65-F5344CB8AC3E}">
+        <p14:creationId xmlns:p14="http://schemas.microsoft.com/office/powerpoint/2010/main" val="8566923"/>
+      </p:ext>
+    </p:extLst>
+  </p:cSld>
+  <p:clrMapOvr>
+    <a:masterClrMapping/>
+  </p:clrMapOvr>
+  <p:timing>
+    <p:tnLst>
+      <p:par>
+        <p:cTn id="1" dur="indefinite" restart="never" nodeType="tmRoot"/>
+      </p:par>
+    </p:tnLst>
+  </p:timing>
+</p:sld>
+</file>
+
+<file path=ppt/slides/slide4.xml><?xml version="1.0" encoding="utf-8"?>
+<p:sld xmlns:a="http://schemas.openxmlformats.org/drawingml/2006/main" xmlns:r="http://schemas.openxmlformats.org/officeDocument/2006/relationships" xmlns:p="http://schemas.openxmlformats.org/presentationml/2006/main">
+  <p:cSld>
+    <p:spTree>
+      <p:nvGrpSpPr>
+        <p:cNvPr id="1" name=""/>
+        <p:cNvGrpSpPr/>
+        <p:nvPr/>
+      </p:nvGrpSpPr>
+      <p:grpSpPr>
+        <a:xfrm>
+          <a:off x="0" y="0"/>
+          <a:ext cx="0" cy="0"/>
+          <a:chOff x="0" y="0"/>
+          <a:chExt cx="0" cy="0"/>
+        </a:xfrm>
+      </p:grpSpPr>
+      <p:sp>
+        <p:nvSpPr>
+          <p:cNvPr id="2" name="Title 1"/>
+          <p:cNvSpPr>
+            <a:spLocks noGrp="1"/>
+          </p:cNvSpPr>
+          <p:nvPr>
+            <p:ph type="title"/>
+          </p:nvPr>
+        </p:nvSpPr>
+        <p:spPr/>
+        <p:txBody>
+          <a:bodyPr/>
+          <a:lstStyle/>
+          <a:p>
+            <a:r>
+              <a:rPr lang="en-US" dirty="0" smtClean="0"/>
+              <a:t>VXLAN</a:t>
+            </a:r>
+            <a:endParaRPr lang="en-US" dirty="0"/>
+          </a:p>
+        </p:txBody>
+      </p:sp>
+      <p:sp>
+        <p:nvSpPr>
+          <p:cNvPr id="3" name="Content Placeholder 2"/>
+          <p:cNvSpPr>
+            <a:spLocks noGrp="1"/>
+          </p:cNvSpPr>
+          <p:nvPr>
+            <p:ph sz="quarter" idx="13"/>
+          </p:nvPr>
+        </p:nvSpPr>
+        <p:spPr/>
+        <p:txBody>
+          <a:bodyPr/>
+          <a:lstStyle/>
+          <a:p>
+            <a:r>
+              <a:rPr lang="en-US" i="1" cap="none" dirty="0" smtClean="0"/>
+              <a:t>Virtual </a:t>
+            </a:r>
+            <a:r>
+              <a:rPr lang="en-US" i="1" cap="none" dirty="0" err="1" smtClean="0"/>
+              <a:t>eXtensible</a:t>
+            </a:r>
+            <a:r>
+              <a:rPr lang="en-US" i="1" cap="none" dirty="0" smtClean="0"/>
+              <a:t> Local </a:t>
+            </a:r>
+            <a:r>
+              <a:rPr lang="en-US" i="1" cap="none" dirty="0"/>
+              <a:t>A</a:t>
+            </a:r>
+            <a:r>
+              <a:rPr lang="en-US" i="1" cap="none" dirty="0" smtClean="0"/>
+              <a:t>rea </a:t>
+            </a:r>
+            <a:r>
+              <a:rPr lang="en-US" i="1" cap="none" dirty="0"/>
+              <a:t>N</a:t>
+            </a:r>
+            <a:r>
+              <a:rPr lang="en-US" i="1" cap="none" dirty="0" smtClean="0"/>
+              <a:t>etwork</a:t>
+            </a:r>
+            <a:r>
+              <a:rPr lang="en-US" cap="none" dirty="0" smtClean="0"/>
+              <a:t> (VXLAN) is a protocol to overlay a virtualized L2 network over an existing IP network with little setup.</a:t>
+            </a:r>
+          </a:p>
+          <a:p>
+            <a:r>
+              <a:rPr lang="en-US" cap="none" dirty="0"/>
+              <a:t>Thanks to </a:t>
+            </a:r>
+            <a:r>
+              <a:rPr lang="en-US" cap="none" dirty="0" smtClean="0"/>
+              <a:t>patches </a:t>
+            </a:r>
+            <a:r>
+              <a:rPr lang="en-US" cap="none" dirty="0"/>
+              <a:t>from Stephen </a:t>
+            </a:r>
+            <a:r>
+              <a:rPr lang="en-US" cap="none" dirty="0" err="1"/>
+              <a:t>Hemminger</a:t>
+            </a:r>
+            <a:r>
+              <a:rPr lang="en-US" cap="none" dirty="0"/>
+              <a:t>, Linux can act as VTEPs till </a:t>
+            </a:r>
+            <a:r>
+              <a:rPr lang="en-US" cap="none" dirty="0" smtClean="0"/>
+              <a:t>v3.7.0</a:t>
+            </a:r>
+          </a:p>
+          <a:p>
+            <a:r>
+              <a:rPr lang="en-US" cap="none" dirty="0"/>
+              <a:t>Stephen </a:t>
+            </a:r>
+            <a:r>
+              <a:rPr lang="en-US" cap="none" dirty="0" err="1" smtClean="0"/>
+              <a:t>Hemminger</a:t>
+            </a:r>
+            <a:r>
+              <a:rPr lang="en-US" cap="none" dirty="0" smtClean="0"/>
+              <a:t> also created tools, known as iproute2 and bridge, for Linux</a:t>
+            </a:r>
+          </a:p>
+          <a:p>
+            <a:endParaRPr lang="en-US" cap="none" dirty="0"/>
+          </a:p>
+        </p:txBody>
+      </p:sp>
+      <p:pic>
+        <p:nvPicPr>
+          <p:cNvPr id="4" name="Picture 3"/>
+          <p:cNvPicPr>
+            <a:picLocks noChangeAspect="1"/>
+          </p:cNvPicPr>
+          <p:nvPr/>
+        </p:nvPicPr>
+        <p:blipFill>
+          <a:blip r:embed="rId2"/>
+          <a:stretch>
+            <a:fillRect/>
+          </a:stretch>
+        </p:blipFill>
+        <p:spPr>
+          <a:xfrm>
+            <a:off x="9461795" y="3044833"/>
+            <a:ext cx="1340884" cy="1877237"/>
+          </a:xfrm>
+          <a:prstGeom prst="rect">
+            <a:avLst/>
+          </a:prstGeom>
+        </p:spPr>
+      </p:pic>
+    </p:spTree>
+    <p:extLst>
+      <p:ext uri="{BB962C8B-B14F-4D97-AF65-F5344CB8AC3E}">
+        <p14:creationId xmlns:p14="http://schemas.microsoft.com/office/powerpoint/2010/main" val="252911595"/>
+      </p:ext>
+    </p:extLst>
+  </p:cSld>
+  <p:clrMapOvr>
+    <a:masterClrMapping/>
+  </p:clrMapOvr>
+  <p:timing>
+    <p:tnLst>
+      <p:par>
+        <p:cTn id="1" dur="indefinite" restart="never" nodeType="tmRoot"/>
+      </p:par>
+    </p:tnLst>
+  </p:timing>
+</p:sld>
+</file>
+
+<file path=ppt/slides/slide5.xml><?xml version="1.0" encoding="utf-8"?>
+<p:sld xmlns:a="http://schemas.openxmlformats.org/drawingml/2006/main" xmlns:r="http://schemas.openxmlformats.org/officeDocument/2006/relationships" xmlns:p="http://schemas.openxmlformats.org/presentationml/2006/main">
+  <p:cSld>
+    <p:spTree>
+      <p:nvGrpSpPr>
+        <p:cNvPr id="1" name=""/>
+        <p:cNvGrpSpPr/>
+        <p:nvPr/>
+      </p:nvGrpSpPr>
+      <p:grpSpPr>
+        <a:xfrm>
+          <a:off x="0" y="0"/>
+          <a:ext cx="0" cy="0"/>
+          <a:chOff x="0" y="0"/>
+          <a:chExt cx="0" cy="0"/>
+        </a:xfrm>
+      </p:grpSpPr>
+      <p:sp>
+        <p:nvSpPr>
+          <p:cNvPr id="2" name="Title 1"/>
+          <p:cNvSpPr>
+            <a:spLocks noGrp="1"/>
+          </p:cNvSpPr>
+          <p:nvPr>
+            <p:ph type="title"/>
+          </p:nvPr>
+        </p:nvSpPr>
+        <p:spPr/>
+        <p:txBody>
+          <a:bodyPr/>
+          <a:lstStyle/>
+          <a:p>
+            <a:r>
+              <a:rPr lang="en-US" dirty="0" smtClean="0"/>
+              <a:t>Objective of </a:t>
+            </a:r>
+            <a:r>
+              <a:rPr lang="en-US" dirty="0" err="1" smtClean="0"/>
+              <a:t>Vxlan</a:t>
+            </a:r>
+            <a:endParaRPr lang="en-US" dirty="0"/>
+          </a:p>
+        </p:txBody>
+      </p:sp>
+      <p:pic>
+        <p:nvPicPr>
+          <p:cNvPr id="7" name="Content Placeholder 6"/>
+          <p:cNvPicPr>
+            <a:picLocks noGrp="1" noChangeAspect="1"/>
+          </p:cNvPicPr>
+          <p:nvPr>
+            <p:ph sz="quarter" idx="13"/>
+          </p:nvPr>
+        </p:nvPicPr>
+        <p:blipFill>
+          <a:blip r:embed="rId2">
+            <a:extLst>
+              <a:ext uri="{28A0092B-C50C-407E-A947-70E740481C1C}">
+                <a14:useLocalDpi xmlns:a14="http://schemas.microsoft.com/office/drawing/2010/main" val="0"/>
+              </a:ext>
+            </a:extLst>
+          </a:blip>
+          <a:stretch>
+            <a:fillRect/>
+          </a:stretch>
+        </p:blipFill>
+        <p:spPr>
+          <a:xfrm>
+            <a:off x="1216356" y="1835335"/>
+            <a:ext cx="9333985" cy="4316507"/>
+          </a:xfrm>
+        </p:spPr>
+      </p:pic>
+    </p:spTree>
+    <p:extLst>
+      <p:ext uri="{BB962C8B-B14F-4D97-AF65-F5344CB8AC3E}">
+        <p14:creationId xmlns:p14="http://schemas.microsoft.com/office/powerpoint/2010/main" val="637557649"/>
+      </p:ext>
+    </p:extLst>
+  </p:cSld>
+  <p:clrMapOvr>
+    <a:masterClrMapping/>
+  </p:clrMapOvr>
+  <p:timing>
+    <p:tnLst>
+      <p:par>
+        <p:cTn id="1" dur="indefinite" restart="never" nodeType="tmRoot"/>
+      </p:par>
+    </p:tnLst>
+  </p:timing>
+</p:sld>
+</file>
+
+<file path=ppt/slides/slide6.xml><?xml version="1.0" encoding="utf-8"?>
+<p:sld xmlns:a="http://schemas.openxmlformats.org/drawingml/2006/main" xmlns:r="http://schemas.openxmlformats.org/officeDocument/2006/relationships" xmlns:p="http://schemas.openxmlformats.org/presentationml/2006/main">
+  <p:cSld>
+    <p:spTree>
+      <p:nvGrpSpPr>
+        <p:cNvPr id="1" name=""/>
+        <p:cNvGrpSpPr/>
+        <p:nvPr/>
+      </p:nvGrpSpPr>
+      <p:grpSpPr>
+        <a:xfrm>
+          <a:off x="0" y="0"/>
+          <a:ext cx="0" cy="0"/>
+          <a:chOff x="0" y="0"/>
+          <a:chExt cx="0" cy="0"/>
+        </a:xfrm>
+      </p:grpSpPr>
+      <p:sp>
+        <p:nvSpPr>
+          <p:cNvPr id="2" name="Title 1"/>
+          <p:cNvSpPr>
+            <a:spLocks noGrp="1"/>
+          </p:cNvSpPr>
+          <p:nvPr>
+            <p:ph type="title"/>
+          </p:nvPr>
+        </p:nvSpPr>
+        <p:spPr/>
+        <p:txBody>
+          <a:bodyPr/>
+          <a:lstStyle/>
+          <a:p>
+            <a:r>
+              <a:rPr lang="en-US" dirty="0"/>
+              <a:t>Basic mechanism</a:t>
+            </a:r>
+          </a:p>
+        </p:txBody>
+      </p:sp>
+      <p:sp>
+        <p:nvSpPr>
+          <p:cNvPr id="3" name="Content Placeholder 2"/>
+          <p:cNvSpPr>
+            <a:spLocks noGrp="1"/>
+          </p:cNvSpPr>
+          <p:nvPr>
+            <p:ph sz="quarter" idx="13"/>
+          </p:nvPr>
+        </p:nvSpPr>
+        <p:spPr/>
+        <p:txBody>
+          <a:bodyPr/>
+          <a:lstStyle/>
+          <a:p>
+            <a:pPr marL="0" marR="0" lvl="0" indent="0" defTabSz="914400" eaLnBrk="1" fontAlgn="auto" latinLnBrk="0" hangingPunct="1">
+              <a:lnSpc>
+                <a:spcPct val="100000"/>
+              </a:lnSpc>
+              <a:spcBef>
+                <a:spcPts val="0"/>
+              </a:spcBef>
+              <a:spcAft>
+                <a:spcPts val="0"/>
+              </a:spcAft>
+              <a:buClrTx/>
+              <a:buSzTx/>
+              <a:buFontTx/>
+              <a:buNone/>
+              <a:tabLst/>
+              <a:defRPr/>
+            </a:pPr>
+            <a:endParaRPr lang="en-US" dirty="0"/>
+          </a:p>
+        </p:txBody>
+      </p:sp>
+      <p:pic>
+        <p:nvPicPr>
+          <p:cNvPr id="4" name="Picture 3"/>
+          <p:cNvPicPr>
+            <a:picLocks noChangeAspect="1"/>
+          </p:cNvPicPr>
+          <p:nvPr/>
+        </p:nvPicPr>
+        <p:blipFill>
+          <a:blip r:embed="rId2"/>
+          <a:stretch>
+            <a:fillRect/>
+          </a:stretch>
+        </p:blipFill>
+        <p:spPr>
+          <a:xfrm>
+            <a:off x="1254016" y="1739017"/>
+            <a:ext cx="8687426" cy="4913467"/>
+          </a:xfrm>
+          <a:prstGeom prst="rect">
+            <a:avLst/>
+          </a:prstGeom>
+        </p:spPr>
+      </p:pic>
+    </p:spTree>
+    <p:extLst>
+      <p:ext uri="{BB962C8B-B14F-4D97-AF65-F5344CB8AC3E}">
+        <p14:creationId xmlns:p14="http://schemas.microsoft.com/office/powerpoint/2010/main" val="521165751"/>
+      </p:ext>
+    </p:extLst>
+  </p:cSld>
+  <p:clrMapOvr>
+    <a:masterClrMapping/>
+  </p:clrMapOvr>
+  <p:timing>
+    <p:tnLst>
+      <p:par>
+        <p:cTn id="1" dur="indefinite" restart="never" nodeType="tmRoot"/>
+      </p:par>
+    </p:tnLst>
+  </p:timing>
+</p:sld>
+</file>
+
+<file path=ppt/slides/slide7.xml><?xml version="1.0" encoding="utf-8"?>
+<p:sld xmlns:a="http://schemas.openxmlformats.org/drawingml/2006/main" xmlns:r="http://schemas.openxmlformats.org/officeDocument/2006/relationships" xmlns:p="http://schemas.openxmlformats.org/presentationml/2006/main">
+  <p:cSld>
+    <p:spTree>
+      <p:nvGrpSpPr>
+        <p:cNvPr id="1" name=""/>
+        <p:cNvGrpSpPr/>
+        <p:nvPr/>
+      </p:nvGrpSpPr>
+      <p:grpSpPr>
+        <a:xfrm>
+          <a:off x="0" y="0"/>
+          <a:ext cx="0" cy="0"/>
+          <a:chOff x="0" y="0"/>
+          <a:chExt cx="0" cy="0"/>
+        </a:xfrm>
+      </p:grpSpPr>
+      <p:sp>
+        <p:nvSpPr>
+          <p:cNvPr id="2" name="Title 1"/>
+          <p:cNvSpPr>
+            <a:spLocks noGrp="1"/>
+          </p:cNvSpPr>
+          <p:nvPr>
+            <p:ph type="title"/>
+          </p:nvPr>
+        </p:nvSpPr>
+        <p:spPr/>
+        <p:txBody>
+          <a:bodyPr/>
+          <a:lstStyle/>
+          <a:p>
+            <a:r>
+              <a:rPr lang="en-US" dirty="0" smtClean="0"/>
+              <a:t>VTEP</a:t>
+            </a:r>
+            <a:endParaRPr lang="en-US" dirty="0"/>
+          </a:p>
+        </p:txBody>
+      </p:sp>
+      <p:sp>
+        <p:nvSpPr>
+          <p:cNvPr id="3" name="Content Placeholder 2"/>
+          <p:cNvSpPr>
+            <a:spLocks noGrp="1"/>
+          </p:cNvSpPr>
+          <p:nvPr>
+            <p:ph sz="quarter" idx="13"/>
+          </p:nvPr>
+        </p:nvSpPr>
+        <p:spPr/>
+        <p:txBody>
+          <a:bodyPr/>
+          <a:lstStyle/>
+          <a:p>
+            <a:r>
+              <a:rPr lang="en-US" cap="none" dirty="0"/>
+              <a:t>Packet encapsulation is not enough for L2 over L3. VXLAN switches need </a:t>
+            </a:r>
+            <a:r>
+              <a:rPr lang="en-US" cap="none" dirty="0" smtClean="0"/>
+              <a:t>to implement </a:t>
+            </a:r>
+            <a:r>
+              <a:rPr lang="en-US" cap="none" dirty="0"/>
+              <a:t>the following </a:t>
+            </a:r>
+            <a:r>
+              <a:rPr lang="en-US" cap="none" dirty="0" smtClean="0"/>
+              <a:t>features:</a:t>
+            </a:r>
+          </a:p>
+          <a:p>
+            <a:pPr lvl="1"/>
+            <a:r>
+              <a:rPr lang="en-US" cap="none" dirty="0" smtClean="0"/>
+              <a:t>ARP resolution: need to reply to ARP request from local servers without broadcasting the ARP packet.</a:t>
+            </a:r>
+          </a:p>
+          <a:p>
+            <a:pPr lvl="1"/>
+            <a:r>
+              <a:rPr lang="en-US" cap="none" dirty="0" smtClean="0"/>
+              <a:t>Destination search : need to find the destination location corresponding to the destination MAC</a:t>
+            </a:r>
+          </a:p>
+          <a:p>
+            <a:r>
+              <a:rPr lang="en-US" cap="none" dirty="0" smtClean="0"/>
+              <a:t>The VXLAN endpoint providing these features is referred as "VTEP"</a:t>
+            </a:r>
+            <a:endParaRPr lang="en-US" cap="none" dirty="0"/>
+          </a:p>
+        </p:txBody>
+      </p:sp>
+    </p:spTree>
+    <p:extLst>
+      <p:ext uri="{BB962C8B-B14F-4D97-AF65-F5344CB8AC3E}">
+        <p14:creationId xmlns:p14="http://schemas.microsoft.com/office/powerpoint/2010/main" val="645522989"/>
+      </p:ext>
+    </p:extLst>
+  </p:cSld>
+  <p:clrMapOvr>
+    <a:masterClrMapping/>
+  </p:clrMapOvr>
+  <p:timing>
+    <p:tnLst>
+      <p:par>
+        <p:cTn id="1" dur="indefinite" restart="never" nodeType="tmRoot"/>
+      </p:par>
+    </p:tnLst>
+  </p:timing>
+</p:sld>
+</file>
+
+<file path=ppt/slides/slide8.xml><?xml version="1.0" encoding="utf-8"?>
+<p:sld xmlns:a="http://schemas.openxmlformats.org/drawingml/2006/main" xmlns:r="http://schemas.openxmlformats.org/officeDocument/2006/relationships" xmlns:p="http://schemas.openxmlformats.org/presentationml/2006/main">
+  <p:cSld>
+    <p:spTree>
+      <p:nvGrpSpPr>
+        <p:cNvPr id="1" name=""/>
+        <p:cNvGrpSpPr/>
+        <p:nvPr/>
+      </p:nvGrpSpPr>
+      <p:grpSpPr>
+        <a:xfrm>
+          <a:off x="0" y="0"/>
+          <a:ext cx="0" cy="0"/>
+          <a:chOff x="0" y="0"/>
+          <a:chExt cx="0" cy="0"/>
+        </a:xfrm>
+      </p:grpSpPr>
+      <p:sp>
+        <p:nvSpPr>
+          <p:cNvPr id="2" name="Title 1"/>
+          <p:cNvSpPr>
+            <a:spLocks noGrp="1"/>
+          </p:cNvSpPr>
+          <p:nvPr>
+            <p:ph type="title"/>
+          </p:nvPr>
+        </p:nvSpPr>
+        <p:spPr/>
+        <p:txBody>
+          <a:bodyPr/>
+          <a:lstStyle/>
+          <a:p>
+            <a:r>
+              <a:rPr lang="en-US" dirty="0" smtClean="0"/>
+              <a:t>Example: </a:t>
+            </a:r>
+            <a:r>
+              <a:rPr lang="en-US" dirty="0"/>
+              <a:t>Manually</a:t>
+            </a:r>
+            <a:r>
+              <a:rPr lang="en-US" dirty="0" smtClean="0"/>
+              <a:t> Create a Overlay Network</a:t>
+            </a:r>
+            <a:endParaRPr lang="en-US" dirty="0"/>
+          </a:p>
+        </p:txBody>
+      </p:sp>
+      <p:sp>
+        <p:nvSpPr>
+          <p:cNvPr id="3" name="Content Placeholder 2"/>
+          <p:cNvSpPr>
+            <a:spLocks noGrp="1"/>
+          </p:cNvSpPr>
+          <p:nvPr>
+            <p:ph sz="quarter" idx="13"/>
+          </p:nvPr>
+        </p:nvSpPr>
+        <p:spPr/>
+        <p:txBody>
+          <a:bodyPr/>
+          <a:lstStyle/>
+          <a:p>
+            <a:pPr marL="0" marR="0" lvl="0" indent="0" defTabSz="914400" eaLnBrk="1" fontAlgn="auto" latinLnBrk="0" hangingPunct="1">
+              <a:lnSpc>
+                <a:spcPct val="100000"/>
+              </a:lnSpc>
+              <a:spcBef>
+                <a:spcPts val="0"/>
+              </a:spcBef>
+              <a:spcAft>
+                <a:spcPts val="0"/>
+              </a:spcAft>
+              <a:buClrTx/>
+              <a:buSzTx/>
+              <a:buFontTx/>
+              <a:buNone/>
+              <a:tabLst/>
+              <a:defRPr/>
+            </a:pPr>
+            <a:endParaRPr lang="en-US" dirty="0"/>
+          </a:p>
+        </p:txBody>
+      </p:sp>
+      <p:pic>
+        <p:nvPicPr>
+          <p:cNvPr id="4" name="Picture 3"/>
+          <p:cNvPicPr>
+            <a:picLocks noChangeAspect="1"/>
+          </p:cNvPicPr>
+          <p:nvPr/>
+        </p:nvPicPr>
+        <p:blipFill>
+          <a:blip r:embed="rId2"/>
+          <a:stretch>
+            <a:fillRect/>
+          </a:stretch>
+        </p:blipFill>
+        <p:spPr>
+          <a:xfrm>
+            <a:off x="2519917" y="1800025"/>
+            <a:ext cx="6798004" cy="4951649"/>
+          </a:xfrm>
+          <a:prstGeom prst="rect">
+            <a:avLst/>
+          </a:prstGeom>
+        </p:spPr>
+      </p:pic>
+    </p:spTree>
+    <p:extLst>
+      <p:ext uri="{BB962C8B-B14F-4D97-AF65-F5344CB8AC3E}">
+        <p14:creationId xmlns:p14="http://schemas.microsoft.com/office/powerpoint/2010/main" val="1880566722"/>
+      </p:ext>
+    </p:extLst>
+  </p:cSld>
+  <p:clrMapOvr>
+    <a:masterClrMapping/>
+  </p:clrMapOvr>
+  <p:timing>
+    <p:tnLst>
+      <p:par>
+        <p:cTn id="1" dur="indefinite" restart="never" nodeType="tmRoot"/>
+      </p:par>
+    </p:tnLst>
+  </p:timing>
+</p:sld>
+</file>
+
+<file path=ppt/slides/slide9.xml><?xml version="1.0" encoding="utf-8"?>
+<p:sld xmlns:a="http://schemas.openxmlformats.org/drawingml/2006/main" xmlns:r="http://schemas.openxmlformats.org/officeDocument/2006/relationships" xmlns:p="http://schemas.openxmlformats.org/presentationml/2006/main">
+  <p:cSld>
+    <p:spTree>
+      <p:nvGrpSpPr>
+        <p:cNvPr id="1" name=""/>
+        <p:cNvGrpSpPr/>
+        <p:nvPr/>
+      </p:nvGrpSpPr>
+      <p:grpSpPr>
+        <a:xfrm>
+          <a:off x="0" y="0"/>
+          <a:ext cx="0" cy="0"/>
+          <a:chOff x="0" y="0"/>
+          <a:chExt cx="0" cy="0"/>
+        </a:xfrm>
+      </p:grpSpPr>
+      <p:sp>
+        <p:nvSpPr>
+          <p:cNvPr id="2" name="Title 1"/>
+          <p:cNvSpPr>
+            <a:spLocks noGrp="1"/>
+          </p:cNvSpPr>
+          <p:nvPr>
+            <p:ph type="title"/>
+          </p:nvPr>
+        </p:nvSpPr>
+        <p:spPr/>
+        <p:txBody>
+          <a:bodyPr/>
+          <a:lstStyle/>
+          <a:p>
+            <a:r>
+              <a:rPr lang="en-US" dirty="0"/>
+              <a:t>Example: Manually Create a Overlay Network</a:t>
+            </a:r>
+          </a:p>
+        </p:txBody>
+      </p:sp>
+      <p:sp>
+        <p:nvSpPr>
+          <p:cNvPr id="3" name="Content Placeholder 2"/>
+          <p:cNvSpPr>
+            <a:spLocks noGrp="1"/>
+          </p:cNvSpPr>
+          <p:nvPr>
+            <p:ph sz="quarter" idx="13"/>
+          </p:nvPr>
+        </p:nvSpPr>
+        <p:spPr/>
+        <p:txBody>
+          <a:bodyPr/>
+          <a:lstStyle/>
+          <a:p>
+            <a:r>
+              <a:rPr lang="en-US" cap="none" dirty="0" smtClean="0"/>
+              <a:t>Install and setup </a:t>
+            </a:r>
+            <a:r>
+              <a:rPr lang="en-US" cap="none" dirty="0"/>
+              <a:t>D</a:t>
+            </a:r>
+            <a:r>
+              <a:rPr lang="en-US" cap="none" dirty="0" smtClean="0"/>
+              <a:t>ocker Daemon, and set IP ranges by passing --</a:t>
+            </a:r>
+            <a:r>
+              <a:rPr lang="en-US" cap="none" dirty="0" err="1" smtClean="0"/>
+              <a:t>bip</a:t>
+            </a:r>
+            <a:endParaRPr lang="en-US" cap="none" dirty="0" smtClean="0"/>
+          </a:p>
+          <a:p>
+            <a:r>
+              <a:rPr lang="en-US" cap="none" dirty="0" smtClean="0"/>
+              <a:t>Create VTEPs, including virtual </a:t>
+            </a:r>
+            <a:r>
+              <a:rPr lang="en-US" cap="none" dirty="0" err="1" smtClean="0"/>
+              <a:t>vxlan</a:t>
+            </a:r>
+            <a:r>
+              <a:rPr lang="en-US" cap="none" dirty="0" smtClean="0"/>
+              <a:t> devices and routes</a:t>
+            </a:r>
+          </a:p>
+          <a:p>
+            <a:r>
+              <a:rPr lang="en-US" cap="none" dirty="0" smtClean="0"/>
+              <a:t>Create ARP entries across all hosts</a:t>
+            </a:r>
+          </a:p>
+          <a:p>
+            <a:pPr marL="0" indent="0">
+              <a:buNone/>
+            </a:pPr>
+            <a:endParaRPr lang="en-US" cap="none" dirty="0" smtClean="0"/>
+          </a:p>
+          <a:p>
+            <a:pPr marL="0" indent="0">
+              <a:buNone/>
+            </a:pPr>
+            <a:r>
+              <a:rPr lang="en-US" cap="none" dirty="0" smtClean="0"/>
+              <a:t>For Chinese Audiences, </a:t>
+            </a:r>
+            <a:r>
+              <a:rPr lang="en-US" cap="none" dirty="0" err="1" smtClean="0"/>
+              <a:t>pls</a:t>
+            </a:r>
+            <a:r>
+              <a:rPr lang="en-US" cap="none" dirty="0"/>
+              <a:t> refer to </a:t>
+            </a:r>
+            <a:r>
+              <a:rPr lang="en-US" cap="none" dirty="0">
+                <a:hlinkClick r:id="rId2"/>
+              </a:rPr>
+              <a:t>https://</a:t>
+            </a:r>
+            <a:r>
+              <a:rPr lang="en-US" cap="none" dirty="0" smtClean="0">
+                <a:hlinkClick r:id="rId2"/>
+              </a:rPr>
+              <a:t>github.com/yangyuqian/k8s-the-hard-way/blob/master/network/vxlan-flannel-cn.md</a:t>
+            </a:r>
+            <a:r>
+              <a:rPr lang="en-US" cap="none" dirty="0" smtClean="0"/>
+              <a:t> for more details</a:t>
+            </a:r>
+            <a:endParaRPr lang="en-US" cap="none" dirty="0"/>
+          </a:p>
+        </p:txBody>
+      </p:sp>
+    </p:spTree>
+    <p:extLst>
+      <p:ext uri="{BB962C8B-B14F-4D97-AF65-F5344CB8AC3E}">
+        <p14:creationId xmlns:p14="http://schemas.microsoft.com/office/powerpoint/2010/main" val="1508078062"/>
       </p:ext>
     </p:extLst>
   </p:cSld>
@@ -6377,4 +8272,265 @@
     </a:ext>
   </a:extLst>
 </a:theme>
+</file>
+
+<file path=ppt/theme/theme2.xml><?xml version="1.0" encoding="utf-8"?>
+<a:theme xmlns:a="http://schemas.openxmlformats.org/drawingml/2006/main" name="Office Theme">
+  <a:themeElements>
+    <a:clrScheme name="Office">
+      <a:dk1>
+        <a:sysClr val="windowText" lastClr="000000"/>
+      </a:dk1>
+      <a:lt1>
+        <a:sysClr val="window" lastClr="FFFFFF"/>
+      </a:lt1>
+      <a:dk2>
+        <a:srgbClr val="44546A"/>
+      </a:dk2>
+      <a:lt2>
+        <a:srgbClr val="E7E6E6"/>
+      </a:lt2>
+      <a:accent1>
+        <a:srgbClr val="5B9BD5"/>
+      </a:accent1>
+      <a:accent2>
+        <a:srgbClr val="ED7D31"/>
+      </a:accent2>
+      <a:accent3>
+        <a:srgbClr val="A5A5A5"/>
+      </a:accent3>
+      <a:accent4>
+        <a:srgbClr val="FFC000"/>
+      </a:accent4>
+      <a:accent5>
+        <a:srgbClr val="4472C4"/>
+      </a:accent5>
+      <a:accent6>
+        <a:srgbClr val="70AD47"/>
+      </a:accent6>
+      <a:hlink>
+        <a:srgbClr val="0563C1"/>
+      </a:hlink>
+      <a:folHlink>
+        <a:srgbClr val="954F72"/>
+      </a:folHlink>
+    </a:clrScheme>
+    <a:fontScheme name="Office">
+      <a:majorFont>
+        <a:latin typeface="Calibri Light" panose="020F0302020204030204"/>
+        <a:ea typeface=""/>
+        <a:cs typeface=""/>
+        <a:font script="Jpan" typeface="Yu Gothic Light"/>
+        <a:font script="Hang" typeface="맑은 고딕"/>
+        <a:font script="Hans" typeface="DengXian Light"/>
+        <a:font script="Hant" typeface="新細明體"/>
+        <a:font script="Arab" typeface="Times New Roman"/>
+        <a:font script="Hebr" typeface="Times New Roman"/>
+        <a:font script="Thai" typeface="Angsana New"/>
+        <a:font script="Ethi" typeface="Nyala"/>
+        <a:font script="Beng" typeface="Vrinda"/>
+        <a:font script="Gujr" typeface="Shruti"/>
+        <a:font script="Khmr" typeface="MoolBoran"/>
+        <a:font script="Knda" typeface="Tunga"/>
+        <a:font script="Guru" typeface="Raavi"/>
+        <a:font script="Cans" typeface="Euphemia"/>
+        <a:font script="Cher" typeface="Plantagenet Cherokee"/>
+        <a:font script="Yiii" typeface="Microsoft Yi Baiti"/>
+        <a:font script="Tibt" typeface="Microsoft Himalaya"/>
+        <a:font script="Thaa" typeface="MV Boli"/>
+        <a:font script="Deva" typeface="Mangal"/>
+        <a:font script="Telu" typeface="Gautami"/>
+        <a:font script="Taml" typeface="Latha"/>
+        <a:font script="Syrc" typeface="Estrangelo Edessa"/>
+        <a:font script="Orya" typeface="Kalinga"/>
+        <a:font script="Mlym" typeface="Kartika"/>
+        <a:font script="Laoo" typeface="DokChampa"/>
+        <a:font script="Sinh" typeface="Iskoola Pota"/>
+        <a:font script="Mong" typeface="Mongolian Baiti"/>
+        <a:font script="Viet" typeface="Times New Roman"/>
+        <a:font script="Uigh" typeface="Microsoft Uighur"/>
+        <a:font script="Geor" typeface="Sylfaen"/>
+      </a:majorFont>
+      <a:minorFont>
+        <a:latin typeface="Calibri" panose="020F0502020204030204"/>
+        <a:ea typeface=""/>
+        <a:cs typeface=""/>
+        <a:font script="Jpan" typeface="Yu Gothic"/>
+        <a:font script="Hang" typeface="맑은 고딕"/>
+        <a:font script="Hans" typeface="DengXian"/>
+        <a:font script="Hant" typeface="新細明體"/>
+        <a:font script="Arab" typeface="Arial"/>
+        <a:font script="Hebr" typeface="Arial"/>
+        <a:font script="Thai" typeface="Cordia New"/>
+        <a:font script="Ethi" typeface="Nyala"/>
+        <a:font script="Beng" typeface="Vrinda"/>
+        <a:font script="Gujr" typeface="Shruti"/>
+        <a:font script="Khmr" typeface="DaunPenh"/>
+        <a:font script="Knda" typeface="Tunga"/>
+        <a:font script="Guru" typeface="Raavi"/>
+        <a:font script="Cans" typeface="Euphemia"/>
+        <a:font script="Cher" typeface="Plantagenet Cherokee"/>
+        <a:font script="Yiii" typeface="Microsoft Yi Baiti"/>
+        <a:font script="Tibt" typeface="Microsoft Himalaya"/>
+        <a:font script="Thaa" typeface="MV Boli"/>
+        <a:font script="Deva" typeface="Mangal"/>
+        <a:font script="Telu" typeface="Gautami"/>
+        <a:font script="Taml" typeface="Latha"/>
+        <a:font script="Syrc" typeface="Estrangelo Edessa"/>
+        <a:font script="Orya" typeface="Kalinga"/>
+        <a:font script="Mlym" typeface="Kartika"/>
+        <a:font script="Laoo" typeface="DokChampa"/>
+        <a:font script="Sinh" typeface="Iskoola Pota"/>
+        <a:font script="Mong" typeface="Mongolian Baiti"/>
+        <a:font script="Viet" typeface="Arial"/>
+        <a:font script="Uigh" typeface="Microsoft Uighur"/>
+        <a:font script="Geor" typeface="Sylfaen"/>
+      </a:minorFont>
+    </a:fontScheme>
+    <a:fmtScheme name="Office">
+      <a:fillStyleLst>
+        <a:solidFill>
+          <a:schemeClr val="phClr"/>
+        </a:solidFill>
+        <a:gradFill rotWithShape="1">
+          <a:gsLst>
+            <a:gs pos="0">
+              <a:schemeClr val="phClr">
+                <a:lumMod val="110000"/>
+                <a:satMod val="105000"/>
+                <a:tint val="67000"/>
+              </a:schemeClr>
+            </a:gs>
+            <a:gs pos="50000">
+              <a:schemeClr val="phClr">
+                <a:lumMod val="105000"/>
+                <a:satMod val="103000"/>
+                <a:tint val="73000"/>
+              </a:schemeClr>
+            </a:gs>
+            <a:gs pos="100000">
+              <a:schemeClr val="phClr">
+                <a:lumMod val="105000"/>
+                <a:satMod val="109000"/>
+                <a:tint val="81000"/>
+              </a:schemeClr>
+            </a:gs>
+          </a:gsLst>
+          <a:lin ang="5400000" scaled="0"/>
+        </a:gradFill>
+        <a:gradFill rotWithShape="1">
+          <a:gsLst>
+            <a:gs pos="0">
+              <a:schemeClr val="phClr">
+                <a:satMod val="103000"/>
+                <a:lumMod val="102000"/>
+                <a:tint val="94000"/>
+              </a:schemeClr>
+            </a:gs>
+            <a:gs pos="50000">
+              <a:schemeClr val="phClr">
+                <a:satMod val="110000"/>
+                <a:lumMod val="100000"/>
+                <a:shade val="100000"/>
+              </a:schemeClr>
+            </a:gs>
+            <a:gs pos="100000">
+              <a:schemeClr val="phClr">
+                <a:lumMod val="99000"/>
+                <a:satMod val="120000"/>
+                <a:shade val="78000"/>
+              </a:schemeClr>
+            </a:gs>
+          </a:gsLst>
+          <a:lin ang="5400000" scaled="0"/>
+        </a:gradFill>
+      </a:fillStyleLst>
+      <a:lnStyleLst>
+        <a:ln w="6350" cap="flat" cmpd="sng" algn="ctr">
+          <a:solidFill>
+            <a:schemeClr val="phClr"/>
+          </a:solidFill>
+          <a:prstDash val="solid"/>
+          <a:miter lim="800000"/>
+        </a:ln>
+        <a:ln w="12700" cap="flat" cmpd="sng" algn="ctr">
+          <a:solidFill>
+            <a:schemeClr val="phClr"/>
+          </a:solidFill>
+          <a:prstDash val="solid"/>
+          <a:miter lim="800000"/>
+        </a:ln>
+        <a:ln w="19050" cap="flat" cmpd="sng" algn="ctr">
+          <a:solidFill>
+            <a:schemeClr val="phClr"/>
+          </a:solidFill>
+          <a:prstDash val="solid"/>
+          <a:miter lim="800000"/>
+        </a:ln>
+      </a:lnStyleLst>
+      <a:effectStyleLst>
+        <a:effectStyle>
+          <a:effectLst/>
+        </a:effectStyle>
+        <a:effectStyle>
+          <a:effectLst/>
+        </a:effectStyle>
+        <a:effectStyle>
+          <a:effectLst>
+            <a:outerShdw blurRad="57150" dist="19050" dir="5400000" algn="ctr" rotWithShape="0">
+              <a:srgbClr val="000000">
+                <a:alpha val="63000"/>
+              </a:srgbClr>
+            </a:outerShdw>
+          </a:effectLst>
+        </a:effectStyle>
+      </a:effectStyleLst>
+      <a:bgFillStyleLst>
+        <a:solidFill>
+          <a:schemeClr val="phClr"/>
+        </a:solidFill>
+        <a:solidFill>
+          <a:schemeClr val="phClr">
+            <a:tint val="95000"/>
+            <a:satMod val="170000"/>
+          </a:schemeClr>
+        </a:solidFill>
+        <a:gradFill rotWithShape="1">
+          <a:gsLst>
+            <a:gs pos="0">
+              <a:schemeClr val="phClr">
+                <a:tint val="93000"/>
+                <a:satMod val="150000"/>
+                <a:shade val="98000"/>
+                <a:lumMod val="102000"/>
+              </a:schemeClr>
+            </a:gs>
+            <a:gs pos="50000">
+              <a:schemeClr val="phClr">
+                <a:tint val="98000"/>
+                <a:satMod val="130000"/>
+                <a:shade val="90000"/>
+                <a:lumMod val="103000"/>
+              </a:schemeClr>
+            </a:gs>
+            <a:gs pos="100000">
+              <a:schemeClr val="phClr">
+                <a:shade val="63000"/>
+                <a:satMod val="120000"/>
+              </a:schemeClr>
+            </a:gs>
+          </a:gsLst>
+          <a:lin ang="5400000" scaled="0"/>
+        </a:gradFill>
+      </a:bgFillStyleLst>
+    </a:fmtScheme>
+  </a:themeElements>
+  <a:objectDefaults/>
+  <a:extraClrSchemeLst/>
+  <a:extLst>
+    <a:ext uri="{05A4C25C-085E-4340-85A3-A5531E510DB2}">
+      <thm15:themeFamily xmlns:thm15="http://schemas.microsoft.com/office/thememl/2012/main" name="Office Theme" id="{62F939B6-93AF-4DB8-9C6B-D6C7DFDC589F}" vid="{4A3C46E8-61CC-4603-A589-7422A47A8E4A}"/>
+    </a:ext>
+  </a:extLst>
+</a:theme>
 </file>
</xml_diff>

<commit_message>
Add performance test references
</commit_message>
<xml_diff>
--- a/ppt/vxlan-flannel-cn.pptx
+++ b/ppt/vxlan-flannel-cn.pptx
@@ -6697,15 +6697,7 @@
             </a:r>
             <a:r>
               <a:rPr lang="en-US" cap="none" dirty="0" smtClean="0"/>
-              <a:t>ocker Daemon, and set IP ranges </a:t>
-            </a:r>
-            <a:r>
-              <a:rPr lang="en-US" cap="none" dirty="0" smtClean="0"/>
-              <a:t>with </a:t>
-            </a:r>
-            <a:r>
-              <a:rPr lang="en-US" cap="none" dirty="0" smtClean="0"/>
-              <a:t>--</a:t>
+              <a:t>ocker Daemon, and set IP ranges with --</a:t>
             </a:r>
             <a:r>
               <a:rPr lang="en-US" cap="none" dirty="0" err="1" smtClean="0"/>
@@ -6724,24 +6716,14 @@
             </a:r>
             <a:r>
               <a:rPr lang="en-US" cap="none" dirty="0" smtClean="0"/>
-              <a:t> devices and </a:t>
-            </a:r>
+              <a:t> devices and routes with iproute2 and bridge</a:t>
+            </a:r>
+          </a:p>
+          <a:p>
             <a:r>
               <a:rPr lang="en-US" cap="none" dirty="0" smtClean="0"/>
-              <a:t>routes with iproute2 and bridge</a:t>
-            </a:r>
-            <a:endParaRPr lang="en-US" cap="none" dirty="0" smtClean="0"/>
-          </a:p>
-          <a:p>
-            <a:r>
-              <a:rPr lang="en-US" cap="none" dirty="0" smtClean="0"/>
-              <a:t>Create ARP entries across all </a:t>
-            </a:r>
-            <a:r>
-              <a:rPr lang="en-US" cap="none" dirty="0" smtClean="0"/>
-              <a:t>hosts with iproute2</a:t>
-            </a:r>
-            <a:endParaRPr lang="en-US" cap="none" dirty="0" smtClean="0"/>
+              <a:t>Create ARP entries across all hosts with iproute2</a:t>
+            </a:r>
           </a:p>
           <a:p>
             <a:pPr marL="0" indent="0">
@@ -7063,7 +7045,23 @@
             </a:r>
             <a:r>
               <a:rPr lang="en-US" cap="none" dirty="0" smtClean="0"/>
-              <a:t>, then update the ARP cache according to registered subnets</a:t>
+              <a:t>, then update the ARP cache according to registered </a:t>
+            </a:r>
+            <a:r>
+              <a:rPr lang="en-US" cap="none" dirty="0" smtClean="0"/>
+              <a:t>subnets</a:t>
+            </a:r>
+          </a:p>
+          <a:p>
+            <a:r>
+              <a:rPr lang="en-US" cap="none" dirty="0" smtClean="0"/>
+              <a:t>Performance test refers to </a:t>
+            </a:r>
+            <a:r>
+              <a:rPr lang="en-US" cap="none" dirty="0" smtClean="0">
+                <a:hlinkClick r:id="rId2"/>
+              </a:rPr>
+              <a:t>a post of mine</a:t>
             </a:r>
             <a:endParaRPr lang="en-US" cap="none" dirty="0"/>
           </a:p>
@@ -7413,22 +7411,14 @@
             </a:r>
             <a:r>
               <a:rPr lang="en-US" cap="none" dirty="0" smtClean="0"/>
-              <a:t> backend in </a:t>
-            </a:r>
+              <a:t> backend in flannel</a:t>
+            </a:r>
+          </a:p>
+          <a:p>
+            <a:pPr lvl="1"/>
             <a:r>
               <a:rPr lang="en-US" cap="none" dirty="0" smtClean="0"/>
-              <a:t>flannel</a:t>
-            </a:r>
-          </a:p>
-          <a:p>
-            <a:pPr lvl="1"/>
-            <a:r>
-              <a:rPr lang="en-US" cap="none" dirty="0" smtClean="0"/>
-              <a:t>Brief introduction to </a:t>
-            </a:r>
-            <a:r>
-              <a:rPr lang="en-US" cap="none" dirty="0" smtClean="0"/>
-              <a:t>implementation of </a:t>
+              <a:t>Brief introduction to implementation of </a:t>
             </a:r>
             <a:r>
               <a:rPr lang="en-US" cap="none" dirty="0" err="1" smtClean="0"/>
@@ -7438,7 +7428,6 @@
               <a:rPr lang="en-US" cap="none" dirty="0" smtClean="0"/>
               <a:t> backend in Flannel</a:t>
             </a:r>
-            <a:endParaRPr lang="en-US" cap="none" dirty="0" smtClean="0"/>
           </a:p>
         </p:txBody>
       </p:sp>
@@ -8126,15 +8115,7 @@
             </a:r>
             <a:r>
               <a:rPr lang="en-US" dirty="0" smtClean="0"/>
-              <a:t> Create </a:t>
-            </a:r>
-            <a:r>
-              <a:rPr lang="en-US" dirty="0" smtClean="0"/>
-              <a:t>an </a:t>
-            </a:r>
-            <a:r>
-              <a:rPr lang="en-US" dirty="0" smtClean="0"/>
-              <a:t>Overlay Network</a:t>
+              <a:t> Create an Overlay Network</a:t>
             </a:r>
             <a:endParaRPr lang="en-US" dirty="0"/>
           </a:p>

</xml_diff>